<commit_message>
adding several new features and bug fixes
* reporting a list of unique values if 10 or fewer
* report the missing case values in the command line
* fixing div by zero bug when a column is completely empty
* fixing so that the column info is reported in the order it appears
</commit_message>
<xml_diff>
--- a/wickes data cleaning final presentation.pptx
+++ b/wickes data cleaning final presentation.pptx
@@ -4,17 +4,25 @@
   <p:sldMasterIdLst>
     <p:sldMasterId id="2147483858" r:id="rId1"/>
   </p:sldMasterIdLst>
+  <p:notesMasterIdLst>
+    <p:notesMasterId r:id="rId14"/>
+  </p:notesMasterIdLst>
+  <p:handoutMasterIdLst>
+    <p:handoutMasterId r:id="rId15"/>
+  </p:handoutMasterIdLst>
   <p:sldIdLst>
     <p:sldId id="256" r:id="rId2"/>
     <p:sldId id="257" r:id="rId3"/>
-    <p:sldId id="258" r:id="rId4"/>
-    <p:sldId id="259" r:id="rId5"/>
-    <p:sldId id="260" r:id="rId6"/>
-    <p:sldId id="263" r:id="rId7"/>
-    <p:sldId id="265" r:id="rId8"/>
-    <p:sldId id="266" r:id="rId9"/>
-    <p:sldId id="267" r:id="rId10"/>
-    <p:sldId id="264" r:id="rId11"/>
+    <p:sldId id="268" r:id="rId4"/>
+    <p:sldId id="258" r:id="rId5"/>
+    <p:sldId id="269" r:id="rId6"/>
+    <p:sldId id="259" r:id="rId7"/>
+    <p:sldId id="260" r:id="rId8"/>
+    <p:sldId id="263" r:id="rId9"/>
+    <p:sldId id="265" r:id="rId10"/>
+    <p:sldId id="266" r:id="rId11"/>
+    <p:sldId id="267" r:id="rId12"/>
+    <p:sldId id="264" r:id="rId13"/>
   </p:sldIdLst>
   <p:sldSz cx="9144000" cy="6858000" type="screen4x3"/>
   <p:notesSz cx="6858000" cy="9144000"/>
@@ -116,6 +124,523 @@
 </p:presentation>
 </file>
 
+<file path=ppt/handoutMasters/handoutMaster1.xml><?xml version="1.0" encoding="utf-8"?>
+<p:handoutMaster xmlns:a="http://schemas.openxmlformats.org/drawingml/2006/main" xmlns:r="http://schemas.openxmlformats.org/officeDocument/2006/relationships" xmlns:p="http://schemas.openxmlformats.org/presentationml/2006/main">
+  <p:cSld>
+    <p:bg>
+      <p:bgRef idx="1001">
+        <a:schemeClr val="bg1"/>
+      </p:bgRef>
+    </p:bg>
+    <p:spTree>
+      <p:nvGrpSpPr>
+        <p:cNvPr id="1" name=""/>
+        <p:cNvGrpSpPr/>
+        <p:nvPr/>
+      </p:nvGrpSpPr>
+      <p:grpSpPr>
+        <a:xfrm>
+          <a:off x="0" y="0"/>
+          <a:ext cx="0" cy="0"/>
+          <a:chOff x="0" y="0"/>
+          <a:chExt cx="0" cy="0"/>
+        </a:xfrm>
+      </p:grpSpPr>
+      <p:sp>
+        <p:nvSpPr>
+          <p:cNvPr id="2" name="Header Placeholder 1"/>
+          <p:cNvSpPr>
+            <a:spLocks noGrp="1"/>
+          </p:cNvSpPr>
+          <p:nvPr>
+            <p:ph type="hdr" sz="quarter"/>
+          </p:nvPr>
+        </p:nvSpPr>
+        <p:spPr>
+          <a:xfrm>
+            <a:off x="0" y="0"/>
+            <a:ext cx="2971800" cy="457200"/>
+          </a:xfrm>
+          <a:prstGeom prst="rect">
+            <a:avLst/>
+          </a:prstGeom>
+        </p:spPr>
+        <p:txBody>
+          <a:bodyPr vert="horz" lIns="91440" tIns="45720" rIns="91440" bIns="45720" rtlCol="0"/>
+          <a:lstStyle>
+            <a:lvl1pPr algn="l">
+              <a:defRPr sz="1200"/>
+            </a:lvl1pPr>
+          </a:lstStyle>
+          <a:p>
+            <a:endParaRPr lang="en-US"/>
+          </a:p>
+        </p:txBody>
+      </p:sp>
+      <p:sp>
+        <p:nvSpPr>
+          <p:cNvPr id="3" name="Date Placeholder 2"/>
+          <p:cNvSpPr>
+            <a:spLocks noGrp="1"/>
+          </p:cNvSpPr>
+          <p:nvPr>
+            <p:ph type="dt" sz="quarter" idx="1"/>
+          </p:nvPr>
+        </p:nvSpPr>
+        <p:spPr>
+          <a:xfrm>
+            <a:off x="3884613" y="0"/>
+            <a:ext cx="2971800" cy="457200"/>
+          </a:xfrm>
+          <a:prstGeom prst="rect">
+            <a:avLst/>
+          </a:prstGeom>
+        </p:spPr>
+        <p:txBody>
+          <a:bodyPr vert="horz" lIns="91440" tIns="45720" rIns="91440" bIns="45720" rtlCol="0"/>
+          <a:lstStyle>
+            <a:lvl1pPr algn="r">
+              <a:defRPr sz="1200"/>
+            </a:lvl1pPr>
+          </a:lstStyle>
+          <a:p>
+            <a:fld id="{02088753-3C6F-3640-8D54-B36CBD61821E}" type="datetimeFigureOut">
+              <a:rPr lang="en-US" smtClean="0"/>
+              <a:t>5/1/16</a:t>
+            </a:fld>
+            <a:endParaRPr lang="en-US"/>
+          </a:p>
+        </p:txBody>
+      </p:sp>
+      <p:sp>
+        <p:nvSpPr>
+          <p:cNvPr id="4" name="Footer Placeholder 3"/>
+          <p:cNvSpPr>
+            <a:spLocks noGrp="1"/>
+          </p:cNvSpPr>
+          <p:nvPr>
+            <p:ph type="ftr" sz="quarter" idx="2"/>
+          </p:nvPr>
+        </p:nvSpPr>
+        <p:spPr>
+          <a:xfrm>
+            <a:off x="0" y="8685213"/>
+            <a:ext cx="2971800" cy="457200"/>
+          </a:xfrm>
+          <a:prstGeom prst="rect">
+            <a:avLst/>
+          </a:prstGeom>
+        </p:spPr>
+        <p:txBody>
+          <a:bodyPr vert="horz" lIns="91440" tIns="45720" rIns="91440" bIns="45720" rtlCol="0" anchor="b"/>
+          <a:lstStyle>
+            <a:lvl1pPr algn="l">
+              <a:defRPr sz="1200"/>
+            </a:lvl1pPr>
+          </a:lstStyle>
+          <a:p>
+            <a:endParaRPr lang="en-US"/>
+          </a:p>
+        </p:txBody>
+      </p:sp>
+      <p:sp>
+        <p:nvSpPr>
+          <p:cNvPr id="5" name="Slide Number Placeholder 4"/>
+          <p:cNvSpPr>
+            <a:spLocks noGrp="1"/>
+          </p:cNvSpPr>
+          <p:nvPr>
+            <p:ph type="sldNum" sz="quarter" idx="3"/>
+          </p:nvPr>
+        </p:nvSpPr>
+        <p:spPr>
+          <a:xfrm>
+            <a:off x="3884613" y="8685213"/>
+            <a:ext cx="2971800" cy="457200"/>
+          </a:xfrm>
+          <a:prstGeom prst="rect">
+            <a:avLst/>
+          </a:prstGeom>
+        </p:spPr>
+        <p:txBody>
+          <a:bodyPr vert="horz" lIns="91440" tIns="45720" rIns="91440" bIns="45720" rtlCol="0" anchor="b"/>
+          <a:lstStyle>
+            <a:lvl1pPr algn="r">
+              <a:defRPr sz="1200"/>
+            </a:lvl1pPr>
+          </a:lstStyle>
+          <a:p>
+            <a:fld id="{49B60D2A-B8D6-7C43-A8B5-138419B2AB98}" type="slidenum">
+              <a:rPr lang="en-US" smtClean="0"/>
+              <a:t>‹#›</a:t>
+            </a:fld>
+            <a:endParaRPr lang="en-US"/>
+          </a:p>
+        </p:txBody>
+      </p:sp>
+    </p:spTree>
+    <p:extLst>
+      <p:ext uri="{BB962C8B-B14F-4D97-AF65-F5344CB8AC3E}">
+        <p14:creationId xmlns:p14="http://schemas.microsoft.com/office/powerpoint/2010/main" val="1155557889"/>
+      </p:ext>
+    </p:extLst>
+  </p:cSld>
+  <p:clrMap bg1="lt1" tx1="dk1" bg2="lt2" tx2="dk2" accent1="accent1" accent2="accent2" accent3="accent3" accent4="accent4" accent5="accent5" accent6="accent6" hlink="hlink" folHlink="folHlink"/>
+  <p:hf hdr="0" ftr="0" dt="0"/>
+</p:handoutMaster>
+</file>
+
+<file path=ppt/notesMasters/notesMaster1.xml><?xml version="1.0" encoding="utf-8"?>
+<p:notesMaster xmlns:a="http://schemas.openxmlformats.org/drawingml/2006/main" xmlns:r="http://schemas.openxmlformats.org/officeDocument/2006/relationships" xmlns:p="http://schemas.openxmlformats.org/presentationml/2006/main">
+  <p:cSld>
+    <p:bg>
+      <p:bgRef idx="1001">
+        <a:schemeClr val="bg1"/>
+      </p:bgRef>
+    </p:bg>
+    <p:spTree>
+      <p:nvGrpSpPr>
+        <p:cNvPr id="1" name=""/>
+        <p:cNvGrpSpPr/>
+        <p:nvPr/>
+      </p:nvGrpSpPr>
+      <p:grpSpPr>
+        <a:xfrm>
+          <a:off x="0" y="0"/>
+          <a:ext cx="0" cy="0"/>
+          <a:chOff x="0" y="0"/>
+          <a:chExt cx="0" cy="0"/>
+        </a:xfrm>
+      </p:grpSpPr>
+      <p:sp>
+        <p:nvSpPr>
+          <p:cNvPr id="2" name="Header Placeholder 1"/>
+          <p:cNvSpPr>
+            <a:spLocks noGrp="1"/>
+          </p:cNvSpPr>
+          <p:nvPr>
+            <p:ph type="hdr" sz="quarter"/>
+          </p:nvPr>
+        </p:nvSpPr>
+        <p:spPr>
+          <a:xfrm>
+            <a:off x="0" y="0"/>
+            <a:ext cx="2971800" cy="457200"/>
+          </a:xfrm>
+          <a:prstGeom prst="rect">
+            <a:avLst/>
+          </a:prstGeom>
+        </p:spPr>
+        <p:txBody>
+          <a:bodyPr vert="horz" lIns="91440" tIns="45720" rIns="91440" bIns="45720" rtlCol="0"/>
+          <a:lstStyle>
+            <a:lvl1pPr algn="l">
+              <a:defRPr sz="1200"/>
+            </a:lvl1pPr>
+          </a:lstStyle>
+          <a:p>
+            <a:endParaRPr lang="en-US"/>
+          </a:p>
+        </p:txBody>
+      </p:sp>
+      <p:sp>
+        <p:nvSpPr>
+          <p:cNvPr id="3" name="Date Placeholder 2"/>
+          <p:cNvSpPr>
+            <a:spLocks noGrp="1"/>
+          </p:cNvSpPr>
+          <p:nvPr>
+            <p:ph type="dt" idx="1"/>
+          </p:nvPr>
+        </p:nvSpPr>
+        <p:spPr>
+          <a:xfrm>
+            <a:off x="3884613" y="0"/>
+            <a:ext cx="2971800" cy="457200"/>
+          </a:xfrm>
+          <a:prstGeom prst="rect">
+            <a:avLst/>
+          </a:prstGeom>
+        </p:spPr>
+        <p:txBody>
+          <a:bodyPr vert="horz" lIns="91440" tIns="45720" rIns="91440" bIns="45720" rtlCol="0"/>
+          <a:lstStyle>
+            <a:lvl1pPr algn="r">
+              <a:defRPr sz="1200"/>
+            </a:lvl1pPr>
+          </a:lstStyle>
+          <a:p>
+            <a:fld id="{22D70388-3724-1C44-BC3B-DC6588A9327A}" type="datetimeFigureOut">
+              <a:rPr lang="en-US" smtClean="0"/>
+              <a:t>5/1/16</a:t>
+            </a:fld>
+            <a:endParaRPr lang="en-US"/>
+          </a:p>
+        </p:txBody>
+      </p:sp>
+      <p:sp>
+        <p:nvSpPr>
+          <p:cNvPr id="4" name="Slide Image Placeholder 3"/>
+          <p:cNvSpPr>
+            <a:spLocks noGrp="1" noRot="1" noChangeAspect="1"/>
+          </p:cNvSpPr>
+          <p:nvPr>
+            <p:ph type="sldImg" idx="2"/>
+          </p:nvPr>
+        </p:nvSpPr>
+        <p:spPr>
+          <a:xfrm>
+            <a:off x="1143000" y="685800"/>
+            <a:ext cx="4572000" cy="3429000"/>
+          </a:xfrm>
+          <a:prstGeom prst="rect">
+            <a:avLst/>
+          </a:prstGeom>
+          <a:noFill/>
+          <a:ln w="12700">
+            <a:solidFill>
+              <a:prstClr val="black"/>
+            </a:solidFill>
+          </a:ln>
+        </p:spPr>
+        <p:txBody>
+          <a:bodyPr vert="horz" lIns="91440" tIns="45720" rIns="91440" bIns="45720" rtlCol="0" anchor="ctr"/>
+          <a:lstStyle/>
+          <a:p>
+            <a:endParaRPr lang="en-US"/>
+          </a:p>
+        </p:txBody>
+      </p:sp>
+      <p:sp>
+        <p:nvSpPr>
+          <p:cNvPr id="5" name="Notes Placeholder 4"/>
+          <p:cNvSpPr>
+            <a:spLocks noGrp="1"/>
+          </p:cNvSpPr>
+          <p:nvPr>
+            <p:ph type="body" sz="quarter" idx="3"/>
+          </p:nvPr>
+        </p:nvSpPr>
+        <p:spPr>
+          <a:xfrm>
+            <a:off x="685800" y="4343400"/>
+            <a:ext cx="5486400" cy="4114800"/>
+          </a:xfrm>
+          <a:prstGeom prst="rect">
+            <a:avLst/>
+          </a:prstGeom>
+        </p:spPr>
+        <p:txBody>
+          <a:bodyPr vert="horz" lIns="91440" tIns="45720" rIns="91440" bIns="45720" rtlCol="0"/>
+          <a:lstStyle/>
+          <a:p>
+            <a:pPr lvl="0"/>
+            <a:r>
+              <a:rPr lang="en-US" smtClean="0"/>
+              <a:t>Click to edit Master text styles</a:t>
+            </a:r>
+          </a:p>
+          <a:p>
+            <a:pPr lvl="1"/>
+            <a:r>
+              <a:rPr lang="en-US" smtClean="0"/>
+              <a:t>Second level</a:t>
+            </a:r>
+          </a:p>
+          <a:p>
+            <a:pPr lvl="2"/>
+            <a:r>
+              <a:rPr lang="en-US" smtClean="0"/>
+              <a:t>Third level</a:t>
+            </a:r>
+          </a:p>
+          <a:p>
+            <a:pPr lvl="3"/>
+            <a:r>
+              <a:rPr lang="en-US" smtClean="0"/>
+              <a:t>Fourth level</a:t>
+            </a:r>
+          </a:p>
+          <a:p>
+            <a:pPr lvl="4"/>
+            <a:r>
+              <a:rPr lang="en-US" smtClean="0"/>
+              <a:t>Fifth level</a:t>
+            </a:r>
+            <a:endParaRPr lang="en-US"/>
+          </a:p>
+        </p:txBody>
+      </p:sp>
+      <p:sp>
+        <p:nvSpPr>
+          <p:cNvPr id="6" name="Footer Placeholder 5"/>
+          <p:cNvSpPr>
+            <a:spLocks noGrp="1"/>
+          </p:cNvSpPr>
+          <p:nvPr>
+            <p:ph type="ftr" sz="quarter" idx="4"/>
+          </p:nvPr>
+        </p:nvSpPr>
+        <p:spPr>
+          <a:xfrm>
+            <a:off x="0" y="8685213"/>
+            <a:ext cx="2971800" cy="457200"/>
+          </a:xfrm>
+          <a:prstGeom prst="rect">
+            <a:avLst/>
+          </a:prstGeom>
+        </p:spPr>
+        <p:txBody>
+          <a:bodyPr vert="horz" lIns="91440" tIns="45720" rIns="91440" bIns="45720" rtlCol="0" anchor="b"/>
+          <a:lstStyle>
+            <a:lvl1pPr algn="l">
+              <a:defRPr sz="1200"/>
+            </a:lvl1pPr>
+          </a:lstStyle>
+          <a:p>
+            <a:endParaRPr lang="en-US"/>
+          </a:p>
+        </p:txBody>
+      </p:sp>
+      <p:sp>
+        <p:nvSpPr>
+          <p:cNvPr id="7" name="Slide Number Placeholder 6"/>
+          <p:cNvSpPr>
+            <a:spLocks noGrp="1"/>
+          </p:cNvSpPr>
+          <p:nvPr>
+            <p:ph type="sldNum" sz="quarter" idx="5"/>
+          </p:nvPr>
+        </p:nvSpPr>
+        <p:spPr>
+          <a:xfrm>
+            <a:off x="3884613" y="8685213"/>
+            <a:ext cx="2971800" cy="457200"/>
+          </a:xfrm>
+          <a:prstGeom prst="rect">
+            <a:avLst/>
+          </a:prstGeom>
+        </p:spPr>
+        <p:txBody>
+          <a:bodyPr vert="horz" lIns="91440" tIns="45720" rIns="91440" bIns="45720" rtlCol="0" anchor="b"/>
+          <a:lstStyle>
+            <a:lvl1pPr algn="r">
+              <a:defRPr sz="1200"/>
+            </a:lvl1pPr>
+          </a:lstStyle>
+          <a:p>
+            <a:fld id="{9ECC2D55-8A6F-6E43-90A3-49C7DAE5815D}" type="slidenum">
+              <a:rPr lang="en-US" smtClean="0"/>
+              <a:t>‹#›</a:t>
+            </a:fld>
+            <a:endParaRPr lang="en-US"/>
+          </a:p>
+        </p:txBody>
+      </p:sp>
+    </p:spTree>
+    <p:extLst>
+      <p:ext uri="{BB962C8B-B14F-4D97-AF65-F5344CB8AC3E}">
+        <p14:creationId xmlns:p14="http://schemas.microsoft.com/office/powerpoint/2010/main" val="3838465169"/>
+      </p:ext>
+    </p:extLst>
+  </p:cSld>
+  <p:clrMap bg1="lt1" tx1="dk1" bg2="lt2" tx2="dk2" accent1="accent1" accent2="accent2" accent3="accent3" accent4="accent4" accent5="accent5" accent6="accent6" hlink="hlink" folHlink="folHlink"/>
+  <p:hf hdr="0" ftr="0" dt="0"/>
+  <p:notesStyle>
+    <a:lvl1pPr marL="0" algn="l" defTabSz="457200" rtl="0" eaLnBrk="1" latinLnBrk="0" hangingPunct="1">
+      <a:defRPr sz="1200" kern="1200">
+        <a:solidFill>
+          <a:schemeClr val="tx1"/>
+        </a:solidFill>
+        <a:latin typeface="+mn-lt"/>
+        <a:ea typeface="+mn-ea"/>
+        <a:cs typeface="+mn-cs"/>
+      </a:defRPr>
+    </a:lvl1pPr>
+    <a:lvl2pPr marL="457200" algn="l" defTabSz="457200" rtl="0" eaLnBrk="1" latinLnBrk="0" hangingPunct="1">
+      <a:defRPr sz="1200" kern="1200">
+        <a:solidFill>
+          <a:schemeClr val="tx1"/>
+        </a:solidFill>
+        <a:latin typeface="+mn-lt"/>
+        <a:ea typeface="+mn-ea"/>
+        <a:cs typeface="+mn-cs"/>
+      </a:defRPr>
+    </a:lvl2pPr>
+    <a:lvl3pPr marL="914400" algn="l" defTabSz="457200" rtl="0" eaLnBrk="1" latinLnBrk="0" hangingPunct="1">
+      <a:defRPr sz="1200" kern="1200">
+        <a:solidFill>
+          <a:schemeClr val="tx1"/>
+        </a:solidFill>
+        <a:latin typeface="+mn-lt"/>
+        <a:ea typeface="+mn-ea"/>
+        <a:cs typeface="+mn-cs"/>
+      </a:defRPr>
+    </a:lvl3pPr>
+    <a:lvl4pPr marL="1371600" algn="l" defTabSz="457200" rtl="0" eaLnBrk="1" latinLnBrk="0" hangingPunct="1">
+      <a:defRPr sz="1200" kern="1200">
+        <a:solidFill>
+          <a:schemeClr val="tx1"/>
+        </a:solidFill>
+        <a:latin typeface="+mn-lt"/>
+        <a:ea typeface="+mn-ea"/>
+        <a:cs typeface="+mn-cs"/>
+      </a:defRPr>
+    </a:lvl4pPr>
+    <a:lvl5pPr marL="1828800" algn="l" defTabSz="457200" rtl="0" eaLnBrk="1" latinLnBrk="0" hangingPunct="1">
+      <a:defRPr sz="1200" kern="1200">
+        <a:solidFill>
+          <a:schemeClr val="tx1"/>
+        </a:solidFill>
+        <a:latin typeface="+mn-lt"/>
+        <a:ea typeface="+mn-ea"/>
+        <a:cs typeface="+mn-cs"/>
+      </a:defRPr>
+    </a:lvl5pPr>
+    <a:lvl6pPr marL="2286000" algn="l" defTabSz="457200" rtl="0" eaLnBrk="1" latinLnBrk="0" hangingPunct="1">
+      <a:defRPr sz="1200" kern="1200">
+        <a:solidFill>
+          <a:schemeClr val="tx1"/>
+        </a:solidFill>
+        <a:latin typeface="+mn-lt"/>
+        <a:ea typeface="+mn-ea"/>
+        <a:cs typeface="+mn-cs"/>
+      </a:defRPr>
+    </a:lvl6pPr>
+    <a:lvl7pPr marL="2743200" algn="l" defTabSz="457200" rtl="0" eaLnBrk="1" latinLnBrk="0" hangingPunct="1">
+      <a:defRPr sz="1200" kern="1200">
+        <a:solidFill>
+          <a:schemeClr val="tx1"/>
+        </a:solidFill>
+        <a:latin typeface="+mn-lt"/>
+        <a:ea typeface="+mn-ea"/>
+        <a:cs typeface="+mn-cs"/>
+      </a:defRPr>
+    </a:lvl7pPr>
+    <a:lvl8pPr marL="3200400" algn="l" defTabSz="457200" rtl="0" eaLnBrk="1" latinLnBrk="0" hangingPunct="1">
+      <a:defRPr sz="1200" kern="1200">
+        <a:solidFill>
+          <a:schemeClr val="tx1"/>
+        </a:solidFill>
+        <a:latin typeface="+mn-lt"/>
+        <a:ea typeface="+mn-ea"/>
+        <a:cs typeface="+mn-cs"/>
+      </a:defRPr>
+    </a:lvl8pPr>
+    <a:lvl9pPr marL="3657600" algn="l" defTabSz="457200" rtl="0" eaLnBrk="1" latinLnBrk="0" hangingPunct="1">
+      <a:defRPr sz="1200" kern="1200">
+        <a:solidFill>
+          <a:schemeClr val="tx1"/>
+        </a:solidFill>
+        <a:latin typeface="+mn-lt"/>
+        <a:ea typeface="+mn-ea"/>
+        <a:cs typeface="+mn-cs"/>
+      </a:defRPr>
+    </a:lvl9pPr>
+  </p:notesStyle>
+</p:notesMaster>
+</file>
+
 <file path=ppt/slideLayouts/slideLayout1.xml><?xml version="1.0" encoding="utf-8"?>
 <p:sldLayout xmlns:a="http://schemas.openxmlformats.org/drawingml/2006/main" xmlns:r="http://schemas.openxmlformats.org/officeDocument/2006/relationships" xmlns:p="http://schemas.openxmlformats.org/presentationml/2006/main" type="title" preserve="1">
   <p:cSld name="Title Slide">
@@ -301,9 +826,9 @@
           <a:bodyPr/>
           <a:lstStyle/>
           <a:p>
-            <a:fld id="{C220827E-6AD4-344A-9F61-CE7B8DD199A9}" type="datetimeFigureOut">
-              <a:rPr lang="en-US" smtClean="0"/>
-              <a:t>4/28/16</a:t>
+            <a:fld id="{13634A94-BE56-964E-912C-2B9CBA08D2F0}" type="datetime1">
+              <a:rPr lang="en-US" smtClean="0"/>
+              <a:t>5/1/16</a:t>
             </a:fld>
             <a:endParaRPr lang="en-US"/>
           </a:p>
@@ -467,9 +992,9 @@
           <a:bodyPr/>
           <a:lstStyle/>
           <a:p>
-            <a:fld id="{C220827E-6AD4-344A-9F61-CE7B8DD199A9}" type="datetimeFigureOut">
-              <a:rPr lang="en-US" smtClean="0"/>
-              <a:t>4/28/16</a:t>
+            <a:fld id="{57321BAB-9E79-C44A-B283-5364ECB98535}" type="datetime1">
+              <a:rPr lang="en-US" smtClean="0"/>
+              <a:t>5/1/16</a:t>
             </a:fld>
             <a:endParaRPr lang="en-US"/>
           </a:p>
@@ -642,9 +1167,9 @@
           <a:bodyPr/>
           <a:lstStyle/>
           <a:p>
-            <a:fld id="{C220827E-6AD4-344A-9F61-CE7B8DD199A9}" type="datetimeFigureOut">
-              <a:rPr lang="en-US" smtClean="0"/>
-              <a:t>4/28/16</a:t>
+            <a:fld id="{44B0C4EA-C539-1844-ABAC-533AA86FA944}" type="datetime1">
+              <a:rPr lang="en-US" smtClean="0"/>
+              <a:t>5/1/16</a:t>
             </a:fld>
             <a:endParaRPr lang="en-US"/>
           </a:p>
@@ -807,9 +1332,9 @@
           <a:bodyPr/>
           <a:lstStyle/>
           <a:p>
-            <a:fld id="{C220827E-6AD4-344A-9F61-CE7B8DD199A9}" type="datetimeFigureOut">
-              <a:rPr lang="en-US" smtClean="0"/>
-              <a:t>4/28/16</a:t>
+            <a:fld id="{C82AB3D3-2195-0945-97FE-F54199274F79}" type="datetime1">
+              <a:rPr lang="en-US" smtClean="0"/>
+              <a:t>5/1/16</a:t>
             </a:fld>
             <a:endParaRPr lang="en-US"/>
           </a:p>
@@ -1046,9 +1571,9 @@
           <a:bodyPr/>
           <a:lstStyle/>
           <a:p>
-            <a:fld id="{C220827E-6AD4-344A-9F61-CE7B8DD199A9}" type="datetimeFigureOut">
-              <a:rPr lang="en-US" smtClean="0"/>
-              <a:t>4/28/16</a:t>
+            <a:fld id="{D6BDAC44-60B5-3D47-8CFF-C4A6DF1DF45C}" type="datetime1">
+              <a:rPr lang="en-US" smtClean="0"/>
+              <a:t>5/1/16</a:t>
             </a:fld>
             <a:endParaRPr lang="en-US"/>
           </a:p>
@@ -1137,9 +1662,9 @@
           <a:bodyPr/>
           <a:lstStyle/>
           <a:p>
-            <a:fld id="{C220827E-6AD4-344A-9F61-CE7B8DD199A9}" type="datetimeFigureOut">
-              <a:rPr lang="en-US" smtClean="0"/>
-              <a:t>4/28/16</a:t>
+            <a:fld id="{77060373-0135-1942-BBBF-894AD4CD0257}" type="datetime1">
+              <a:rPr lang="en-US" smtClean="0"/>
+              <a:t>5/1/16</a:t>
             </a:fld>
             <a:endParaRPr lang="en-US"/>
           </a:p>
@@ -1511,9 +2036,9 @@
           <a:bodyPr/>
           <a:lstStyle/>
           <a:p>
-            <a:fld id="{C220827E-6AD4-344A-9F61-CE7B8DD199A9}" type="datetimeFigureOut">
-              <a:rPr lang="en-US" smtClean="0"/>
-              <a:t>4/28/16</a:t>
+            <a:fld id="{35A29D9C-9A08-FF42-82C3-8E5F3CB9EC08}" type="datetime1">
+              <a:rPr lang="en-US" smtClean="0"/>
+              <a:t>5/1/16</a:t>
             </a:fld>
             <a:endParaRPr lang="en-US"/>
           </a:p>
@@ -1766,9 +2291,9 @@
           <a:bodyPr/>
           <a:lstStyle/>
           <a:p>
-            <a:fld id="{C220827E-6AD4-344A-9F61-CE7B8DD199A9}" type="datetimeFigureOut">
-              <a:rPr lang="en-US" smtClean="0"/>
-              <a:t>4/28/16</a:t>
+            <a:fld id="{3E3FE1DA-368A-B44D-9225-4329C066507F}" type="datetime1">
+              <a:rPr lang="en-US" smtClean="0"/>
+              <a:t>5/1/16</a:t>
             </a:fld>
             <a:endParaRPr lang="en-US"/>
           </a:p>
@@ -1856,9 +2381,9 @@
           <a:bodyPr/>
           <a:lstStyle/>
           <a:p>
-            <a:fld id="{C220827E-6AD4-344A-9F61-CE7B8DD199A9}" type="datetimeFigureOut">
-              <a:rPr lang="en-US" smtClean="0"/>
-              <a:t>4/28/16</a:t>
+            <a:fld id="{70D0F048-E246-7E4F-81D1-1C755DBB6F8B}" type="datetime1">
+              <a:rPr lang="en-US" smtClean="0"/>
+              <a:t>5/1/16</a:t>
             </a:fld>
             <a:endParaRPr lang="en-US"/>
           </a:p>
@@ -2130,9 +2655,9 @@
           <a:bodyPr/>
           <a:lstStyle/>
           <a:p>
-            <a:fld id="{C220827E-6AD4-344A-9F61-CE7B8DD199A9}" type="datetimeFigureOut">
-              <a:rPr lang="en-US" smtClean="0"/>
-              <a:t>4/28/16</a:t>
+            <a:fld id="{5A9D7097-66DE-184F-A124-1353669E0B01}" type="datetime1">
+              <a:rPr lang="en-US" smtClean="0"/>
+              <a:t>5/1/16</a:t>
             </a:fld>
             <a:endParaRPr lang="en-US"/>
           </a:p>
@@ -2402,9 +2927,9 @@
           <a:bodyPr/>
           <a:lstStyle/>
           <a:p>
-            <a:fld id="{C220827E-6AD4-344A-9F61-CE7B8DD199A9}" type="datetimeFigureOut">
-              <a:rPr lang="en-US" smtClean="0"/>
-              <a:t>4/28/16</a:t>
+            <a:fld id="{6EA2C57E-2098-4244-AAC9-71F446E64CB4}" type="datetime1">
+              <a:rPr lang="en-US" smtClean="0"/>
+              <a:t>5/1/16</a:t>
             </a:fld>
             <a:endParaRPr lang="en-US"/>
           </a:p>
@@ -2702,9 +3227,9 @@
             </a:lvl1pPr>
           </a:lstStyle>
           <a:p>
-            <a:fld id="{C220827E-6AD4-344A-9F61-CE7B8DD199A9}" type="datetimeFigureOut">
-              <a:rPr lang="en-US" smtClean="0"/>
-              <a:t>4/28/16</a:t>
+            <a:fld id="{DE8F5022-78CB-CC43-80F4-17D6F3C7A527}" type="datetime1">
+              <a:rPr lang="en-US" smtClean="0"/>
+              <a:t>5/1/16</a:t>
             </a:fld>
             <a:endParaRPr lang="en-US"/>
           </a:p>
@@ -2800,6 +3325,7 @@
     <p:sldLayoutId id="2147483868" r:id="rId10"/>
     <p:sldLayoutId id="2147483869" r:id="rId11"/>
   </p:sldLayoutIdLst>
+  <p:hf hdr="0" ftr="0" dt="0"/>
   <p:txStyles>
     <p:titleStyle>
       <a:lvl1pPr algn="l" defTabSz="914400" rtl="0" eaLnBrk="1" latinLnBrk="0" hangingPunct="1">
@@ -3226,6 +3752,30 @@
           </a:p>
         </p:txBody>
       </p:sp>
+      <p:sp>
+        <p:nvSpPr>
+          <p:cNvPr id="4" name="Slide Number Placeholder 3"/>
+          <p:cNvSpPr>
+            <a:spLocks noGrp="1"/>
+          </p:cNvSpPr>
+          <p:nvPr>
+            <p:ph type="sldNum" sz="quarter" idx="11"/>
+          </p:nvPr>
+        </p:nvSpPr>
+        <p:spPr/>
+        <p:txBody>
+          <a:bodyPr/>
+          <a:lstStyle/>
+          <a:p>
+            <a:fld id="{CE8079A4-7AA8-4A4F-87E2-7781EC5097DD}" type="slidenum">
+              <a:rPr lang="en-US" smtClean="0"/>
+              <a:pPr/>
+              <a:t>1</a:t>
+            </a:fld>
+            <a:endParaRPr lang="en-US"/>
+          </a:p>
+        </p:txBody>
+      </p:sp>
     </p:spTree>
     <p:extLst>
       <p:ext uri="{BB962C8B-B14F-4D97-AF65-F5344CB8AC3E}">
@@ -3258,6 +3808,269 @@
       </p:grpSpPr>
       <p:sp>
         <p:nvSpPr>
+          <p:cNvPr id="4" name="Title 1"/>
+          <p:cNvSpPr>
+            <a:spLocks noGrp="1"/>
+          </p:cNvSpPr>
+          <p:nvPr>
+            <p:ph type="title"/>
+          </p:nvPr>
+        </p:nvSpPr>
+        <p:spPr>
+          <a:xfrm>
+            <a:off x="914400" y="0"/>
+            <a:ext cx="7315200" cy="1154097"/>
+          </a:xfrm>
+        </p:spPr>
+        <p:txBody>
+          <a:bodyPr/>
+          <a:lstStyle/>
+          <a:p>
+            <a:r>
+              <a:rPr lang="en-US" dirty="0" smtClean="0"/>
+              <a:t>Basic use</a:t>
+            </a:r>
+            <a:endParaRPr lang="en-US" dirty="0"/>
+          </a:p>
+        </p:txBody>
+      </p:sp>
+      <p:pic>
+        <p:nvPicPr>
+          <p:cNvPr id="5" name="Picture 4" descr="Screen Shot 2016-04-30 at 9.56.54 PM.png"/>
+          <p:cNvPicPr>
+            <a:picLocks noChangeAspect="1"/>
+          </p:cNvPicPr>
+          <p:nvPr/>
+        </p:nvPicPr>
+        <p:blipFill>
+          <a:blip r:embed="rId2">
+            <a:extLst>
+              <a:ext uri="{28A0092B-C50C-407E-A947-70E740481C1C}">
+                <a14:useLocalDpi xmlns:a14="http://schemas.microsoft.com/office/drawing/2010/main" val="0"/>
+              </a:ext>
+            </a:extLst>
+          </a:blip>
+          <a:stretch>
+            <a:fillRect/>
+          </a:stretch>
+        </p:blipFill>
+        <p:spPr>
+          <a:xfrm>
+            <a:off x="341385" y="877734"/>
+            <a:ext cx="8570473" cy="6662993"/>
+          </a:xfrm>
+          <a:prstGeom prst="rect">
+            <a:avLst/>
+          </a:prstGeom>
+        </p:spPr>
+      </p:pic>
+      <p:sp>
+        <p:nvSpPr>
+          <p:cNvPr id="6" name="Slide Number Placeholder 5"/>
+          <p:cNvSpPr>
+            <a:spLocks noGrp="1"/>
+          </p:cNvSpPr>
+          <p:nvPr>
+            <p:ph type="sldNum" sz="quarter" idx="12"/>
+          </p:nvPr>
+        </p:nvSpPr>
+        <p:spPr/>
+        <p:txBody>
+          <a:bodyPr/>
+          <a:lstStyle/>
+          <a:p>
+            <a:fld id="{46542EA5-A770-C94D-88E9-5C299D660E39}" type="slidenum">
+              <a:rPr lang="en-US" smtClean="0"/>
+              <a:t>10</a:t>
+            </a:fld>
+            <a:endParaRPr lang="en-US"/>
+          </a:p>
+        </p:txBody>
+      </p:sp>
+    </p:spTree>
+    <p:extLst>
+      <p:ext uri="{BB962C8B-B14F-4D97-AF65-F5344CB8AC3E}">
+        <p14:creationId xmlns:p14="http://schemas.microsoft.com/office/powerpoint/2010/main" val="2103891971"/>
+      </p:ext>
+    </p:extLst>
+  </p:cSld>
+  <p:clrMapOvr>
+    <a:masterClrMapping/>
+  </p:clrMapOvr>
+</p:sld>
+</file>
+
+<file path=ppt/slides/slide11.xml><?xml version="1.0" encoding="utf-8"?>
+<p:sld xmlns:a="http://schemas.openxmlformats.org/drawingml/2006/main" xmlns:r="http://schemas.openxmlformats.org/officeDocument/2006/relationships" xmlns:p="http://schemas.openxmlformats.org/presentationml/2006/main">
+  <p:cSld>
+    <p:spTree>
+      <p:nvGrpSpPr>
+        <p:cNvPr id="1" name=""/>
+        <p:cNvGrpSpPr/>
+        <p:nvPr/>
+      </p:nvGrpSpPr>
+      <p:grpSpPr>
+        <a:xfrm>
+          <a:off x="0" y="0"/>
+          <a:ext cx="0" cy="0"/>
+          <a:chOff x="0" y="0"/>
+          <a:chExt cx="0" cy="0"/>
+        </a:xfrm>
+      </p:grpSpPr>
+      <p:sp>
+        <p:nvSpPr>
+          <p:cNvPr id="4" name="Title 1"/>
+          <p:cNvSpPr>
+            <a:spLocks noGrp="1"/>
+          </p:cNvSpPr>
+          <p:nvPr>
+            <p:ph type="title"/>
+          </p:nvPr>
+        </p:nvSpPr>
+        <p:spPr>
+          <a:xfrm>
+            <a:off x="914400" y="0"/>
+            <a:ext cx="7315200" cy="1154097"/>
+          </a:xfrm>
+        </p:spPr>
+        <p:txBody>
+          <a:bodyPr/>
+          <a:lstStyle/>
+          <a:p>
+            <a:r>
+              <a:rPr lang="en-US" dirty="0" smtClean="0"/>
+              <a:t>Basic use</a:t>
+            </a:r>
+            <a:endParaRPr lang="en-US" dirty="0"/>
+          </a:p>
+        </p:txBody>
+      </p:sp>
+      <p:pic>
+        <p:nvPicPr>
+          <p:cNvPr id="2" name="Picture 1" descr="Screen Shot 2016-04-30 at 10.01.25 PM.png"/>
+          <p:cNvPicPr>
+            <a:picLocks noChangeAspect="1"/>
+          </p:cNvPicPr>
+          <p:nvPr/>
+        </p:nvPicPr>
+        <p:blipFill>
+          <a:blip r:embed="rId2">
+            <a:extLst>
+              <a:ext uri="{28A0092B-C50C-407E-A947-70E740481C1C}">
+                <a14:useLocalDpi xmlns:a14="http://schemas.microsoft.com/office/drawing/2010/main" val="0"/>
+              </a:ext>
+            </a:extLst>
+          </a:blip>
+          <a:stretch>
+            <a:fillRect/>
+          </a:stretch>
+        </p:blipFill>
+        <p:spPr>
+          <a:xfrm>
+            <a:off x="0" y="860237"/>
+            <a:ext cx="9144000" cy="6577093"/>
+          </a:xfrm>
+          <a:prstGeom prst="rect">
+            <a:avLst/>
+          </a:prstGeom>
+        </p:spPr>
+      </p:pic>
+      <p:sp>
+        <p:nvSpPr>
+          <p:cNvPr id="3" name="Slide Number Placeholder 2"/>
+          <p:cNvSpPr>
+            <a:spLocks noGrp="1"/>
+          </p:cNvSpPr>
+          <p:nvPr>
+            <p:ph type="sldNum" sz="quarter" idx="12"/>
+          </p:nvPr>
+        </p:nvSpPr>
+        <p:spPr/>
+        <p:txBody>
+          <a:bodyPr/>
+          <a:lstStyle/>
+          <a:p>
+            <a:fld id="{46542EA5-A770-C94D-88E9-5C299D660E39}" type="slidenum">
+              <a:rPr lang="en-US" smtClean="0"/>
+              <a:t>11</a:t>
+            </a:fld>
+            <a:endParaRPr lang="en-US"/>
+          </a:p>
+        </p:txBody>
+      </p:sp>
+      <p:sp>
+        <p:nvSpPr>
+          <p:cNvPr id="6" name="Rounded Rectangle 5"/>
+          <p:cNvSpPr/>
+          <p:nvPr/>
+        </p:nvSpPr>
+        <p:spPr>
+          <a:xfrm>
+            <a:off x="3987378" y="3440948"/>
+            <a:ext cx="2717425" cy="1133328"/>
+          </a:xfrm>
+          <a:prstGeom prst="roundRect">
+            <a:avLst/>
+          </a:prstGeom>
+        </p:spPr>
+        <p:style>
+          <a:lnRef idx="1">
+            <a:schemeClr val="accent2"/>
+          </a:lnRef>
+          <a:fillRef idx="3">
+            <a:schemeClr val="accent2"/>
+          </a:fillRef>
+          <a:effectRef idx="2">
+            <a:schemeClr val="accent2"/>
+          </a:effectRef>
+          <a:fontRef idx="minor">
+            <a:schemeClr val="lt1"/>
+          </a:fontRef>
+        </p:style>
+        <p:txBody>
+          <a:bodyPr rtlCol="0" anchor="ctr"/>
+          <a:lstStyle/>
+          <a:p>
+            <a:pPr algn="ctr"/>
+            <a:r>
+              <a:rPr lang="en-US" sz="2800" dirty="0" smtClean="0"/>
+              <a:t>UGH markdown</a:t>
+            </a:r>
+          </a:p>
+        </p:txBody>
+      </p:sp>
+    </p:spTree>
+    <p:extLst>
+      <p:ext uri="{BB962C8B-B14F-4D97-AF65-F5344CB8AC3E}">
+        <p14:creationId xmlns:p14="http://schemas.microsoft.com/office/powerpoint/2010/main" val="107101650"/>
+      </p:ext>
+    </p:extLst>
+  </p:cSld>
+  <p:clrMapOvr>
+    <a:masterClrMapping/>
+  </p:clrMapOvr>
+</p:sld>
+</file>
+
+<file path=ppt/slides/slide12.xml><?xml version="1.0" encoding="utf-8"?>
+<p:sld xmlns:a="http://schemas.openxmlformats.org/drawingml/2006/main" xmlns:r="http://schemas.openxmlformats.org/officeDocument/2006/relationships" xmlns:p="http://schemas.openxmlformats.org/presentationml/2006/main">
+  <p:cSld>
+    <p:spTree>
+      <p:nvGrpSpPr>
+        <p:cNvPr id="1" name=""/>
+        <p:cNvGrpSpPr/>
+        <p:nvPr/>
+      </p:nvGrpSpPr>
+      <p:grpSpPr>
+        <a:xfrm>
+          <a:off x="0" y="0"/>
+          <a:ext cx="0" cy="0"/>
+          <a:chOff x="0" y="0"/>
+          <a:chExt cx="0" cy="0"/>
+        </a:xfrm>
+      </p:grpSpPr>
+      <p:sp>
+        <p:nvSpPr>
           <p:cNvPr id="2" name="Title 1"/>
           <p:cNvSpPr>
             <a:spLocks noGrp="1"/>
@@ -3289,28 +4102,91 @@
             <p:ph idx="1"/>
           </p:nvPr>
         </p:nvSpPr>
+        <p:spPr>
+          <a:xfrm>
+            <a:off x="914400" y="2769833"/>
+            <a:ext cx="7315200" cy="4088167"/>
+          </a:xfrm>
+        </p:spPr>
+        <p:txBody>
+          <a:bodyPr>
+            <a:normAutofit/>
+          </a:bodyPr>
+          <a:lstStyle/>
+          <a:p>
+            <a:r>
+              <a:rPr lang="en-US" dirty="0" smtClean="0"/>
+              <a:t>Have a template file that uses the format() method to add values</a:t>
+            </a:r>
+          </a:p>
+          <a:p>
+            <a:r>
+              <a:rPr lang="en-US" dirty="0" smtClean="0"/>
+              <a:t>Some sort of web interface to prompt users to fill out the descriptive narrative</a:t>
+            </a:r>
+          </a:p>
+          <a:p>
+            <a:r>
+              <a:rPr lang="en-US" dirty="0" smtClean="0"/>
+              <a:t>Handle additional data types</a:t>
+            </a:r>
+          </a:p>
+          <a:p>
+            <a:r>
+              <a:rPr lang="en-US" dirty="0" smtClean="0"/>
+              <a:t>Output a data file to run into SQL</a:t>
+            </a:r>
+          </a:p>
+          <a:p>
+            <a:pPr lvl="1"/>
+            <a:r>
+              <a:rPr lang="en-US" dirty="0" smtClean="0"/>
+              <a:t>Originally had a method of exporting the </a:t>
+            </a:r>
+            <a:r>
+              <a:rPr lang="en-US" dirty="0" err="1" smtClean="0"/>
+              <a:t>dataframe</a:t>
+            </a:r>
+            <a:r>
+              <a:rPr lang="en-US" dirty="0" smtClean="0"/>
+              <a:t> to a SQL DB file, but this required extra modules</a:t>
+            </a:r>
+          </a:p>
+          <a:p>
+            <a:pPr lvl="1"/>
+            <a:r>
+              <a:rPr lang="en-US" dirty="0" smtClean="0"/>
+              <a:t>If I dump out a CSV file people can read it into SQL</a:t>
+            </a:r>
+          </a:p>
+          <a:p>
+            <a:r>
+              <a:rPr lang="en-US" dirty="0" smtClean="0"/>
+              <a:t>Basic data mining/correlation matrix to try and profile correlations and other dependencies between columns</a:t>
+            </a:r>
+          </a:p>
+        </p:txBody>
+      </p:sp>
+      <p:sp>
+        <p:nvSpPr>
+          <p:cNvPr id="4" name="Slide Number Placeholder 3"/>
+          <p:cNvSpPr>
+            <a:spLocks noGrp="1"/>
+          </p:cNvSpPr>
+          <p:nvPr>
+            <p:ph type="sldNum" sz="quarter" idx="12"/>
+          </p:nvPr>
+        </p:nvSpPr>
         <p:spPr/>
         <p:txBody>
           <a:bodyPr/>
           <a:lstStyle/>
           <a:p>
-            <a:r>
-              <a:rPr lang="en-US" dirty="0" smtClean="0"/>
-              <a:t>Have a template file that uses the format() method to add values</a:t>
-            </a:r>
-          </a:p>
-          <a:p>
-            <a:r>
-              <a:rPr lang="en-US" dirty="0" smtClean="0"/>
-              <a:t>Some sort of web interface to prompt users to fill out the descriptive narrative</a:t>
-            </a:r>
-          </a:p>
-          <a:p>
-            <a:r>
-              <a:rPr lang="en-US" dirty="0" smtClean="0"/>
-              <a:t>Handle additional data types</a:t>
-            </a:r>
-            <a:endParaRPr lang="en-US" dirty="0"/>
+            <a:fld id="{46542EA5-A770-C94D-88E9-5C299D660E39}" type="slidenum">
+              <a:rPr lang="en-US" smtClean="0"/>
+              <a:t>12</a:t>
+            </a:fld>
+            <a:endParaRPr lang="en-US"/>
           </a:p>
         </p:txBody>
       </p:sp>
@@ -3361,7 +4237,7 @@
           <a:p>
             <a:r>
               <a:rPr lang="en-US" dirty="0" smtClean="0"/>
-              <a:t>Goal</a:t>
+              <a:t>The problem</a:t>
             </a:r>
             <a:endParaRPr lang="en-US" dirty="0"/>
           </a:p>
@@ -3419,6 +4295,29 @@
               <a:t>Can some of this be automated?</a:t>
             </a:r>
             <a:endParaRPr lang="en-US" sz="2400" dirty="0"/>
+          </a:p>
+        </p:txBody>
+      </p:sp>
+      <p:sp>
+        <p:nvSpPr>
+          <p:cNvPr id="4" name="Slide Number Placeholder 3"/>
+          <p:cNvSpPr>
+            <a:spLocks noGrp="1"/>
+          </p:cNvSpPr>
+          <p:nvPr>
+            <p:ph type="sldNum" sz="quarter" idx="12"/>
+          </p:nvPr>
+        </p:nvSpPr>
+        <p:spPr/>
+        <p:txBody>
+          <a:bodyPr/>
+          <a:lstStyle/>
+          <a:p>
+            <a:fld id="{46542EA5-A770-C94D-88E9-5C299D660E39}" type="slidenum">
+              <a:rPr lang="en-US" smtClean="0"/>
+              <a:t>2</a:t>
+            </a:fld>
+            <a:endParaRPr lang="en-US"/>
           </a:p>
         </p:txBody>
       </p:sp>
@@ -3464,6 +4363,146 @@
         </p:nvSpPr>
         <p:spPr/>
         <p:txBody>
+          <a:bodyPr/>
+          <a:lstStyle/>
+          <a:p>
+            <a:r>
+              <a:rPr lang="en-US" dirty="0" smtClean="0"/>
+              <a:t>Project question</a:t>
+            </a:r>
+            <a:endParaRPr lang="en-US" dirty="0"/>
+          </a:p>
+        </p:txBody>
+      </p:sp>
+      <p:sp>
+        <p:nvSpPr>
+          <p:cNvPr id="3" name="Content Placeholder 2"/>
+          <p:cNvSpPr>
+            <a:spLocks noGrp="1"/>
+          </p:cNvSpPr>
+          <p:nvPr>
+            <p:ph idx="1"/>
+          </p:nvPr>
+        </p:nvSpPr>
+        <p:spPr/>
+        <p:txBody>
+          <a:bodyPr/>
+          <a:lstStyle/>
+          <a:p>
+            <a:r>
+              <a:rPr lang="en-US" dirty="0" smtClean="0"/>
+              <a:t>What of the documentation or profiling effort can be automated?</a:t>
+            </a:r>
+          </a:p>
+          <a:p>
+            <a:r>
+              <a:rPr lang="en-US" dirty="0" smtClean="0"/>
+              <a:t>As in…</a:t>
+            </a:r>
+          </a:p>
+          <a:p>
+            <a:r>
+              <a:rPr lang="en-US" dirty="0"/>
+              <a:t>W</a:t>
+            </a:r>
+            <a:r>
+              <a:rPr lang="en-US" dirty="0" smtClean="0"/>
+              <a:t>hich parts of documentation are simple programming problems?</a:t>
+            </a:r>
+          </a:p>
+          <a:p>
+            <a:r>
+              <a:rPr lang="en-US" dirty="0" smtClean="0"/>
+              <a:t>Seems like much of the activity is</a:t>
+            </a:r>
+          </a:p>
+          <a:p>
+            <a:pPr lvl="1"/>
+            <a:r>
+              <a:rPr lang="en-US" dirty="0" smtClean="0"/>
+              <a:t>“Make that number, put it in. Write something” on repetition</a:t>
+            </a:r>
+          </a:p>
+          <a:p>
+            <a:r>
+              <a:rPr lang="en-US" dirty="0" smtClean="0"/>
+              <a:t>Creating a template	</a:t>
+            </a:r>
+          </a:p>
+          <a:p>
+            <a:pPr lvl="1"/>
+            <a:r>
+              <a:rPr lang="en-US" dirty="0" smtClean="0"/>
+              <a:t>So the documenting person can respond to prompts rather than creating something brand new</a:t>
+            </a:r>
+          </a:p>
+        </p:txBody>
+      </p:sp>
+      <p:sp>
+        <p:nvSpPr>
+          <p:cNvPr id="4" name="Slide Number Placeholder 3"/>
+          <p:cNvSpPr>
+            <a:spLocks noGrp="1"/>
+          </p:cNvSpPr>
+          <p:nvPr>
+            <p:ph type="sldNum" sz="quarter" idx="12"/>
+          </p:nvPr>
+        </p:nvSpPr>
+        <p:spPr/>
+        <p:txBody>
+          <a:bodyPr/>
+          <a:lstStyle/>
+          <a:p>
+            <a:fld id="{46542EA5-A770-C94D-88E9-5C299D660E39}" type="slidenum">
+              <a:rPr lang="en-US" smtClean="0"/>
+              <a:t>3</a:t>
+            </a:fld>
+            <a:endParaRPr lang="en-US"/>
+          </a:p>
+        </p:txBody>
+      </p:sp>
+    </p:spTree>
+    <p:extLst>
+      <p:ext uri="{BB962C8B-B14F-4D97-AF65-F5344CB8AC3E}">
+        <p14:creationId xmlns:p14="http://schemas.microsoft.com/office/powerpoint/2010/main" val="2526232815"/>
+      </p:ext>
+    </p:extLst>
+  </p:cSld>
+  <p:clrMapOvr>
+    <a:masterClrMapping/>
+  </p:clrMapOvr>
+</p:sld>
+</file>
+
+<file path=ppt/slides/slide4.xml><?xml version="1.0" encoding="utf-8"?>
+<p:sld xmlns:a="http://schemas.openxmlformats.org/drawingml/2006/main" xmlns:r="http://schemas.openxmlformats.org/officeDocument/2006/relationships" xmlns:p="http://schemas.openxmlformats.org/presentationml/2006/main">
+  <p:cSld>
+    <p:spTree>
+      <p:nvGrpSpPr>
+        <p:cNvPr id="1" name=""/>
+        <p:cNvGrpSpPr/>
+        <p:nvPr/>
+      </p:nvGrpSpPr>
+      <p:grpSpPr>
+        <a:xfrm>
+          <a:off x="0" y="0"/>
+          <a:ext cx="0" cy="0"/>
+          <a:chOff x="0" y="0"/>
+          <a:chExt cx="0" cy="0"/>
+        </a:xfrm>
+      </p:grpSpPr>
+      <p:sp>
+        <p:nvSpPr>
+          <p:cNvPr id="2" name="Title 1"/>
+          <p:cNvSpPr>
+            <a:spLocks noGrp="1"/>
+          </p:cNvSpPr>
+          <p:nvPr>
+            <p:ph type="title"/>
+          </p:nvPr>
+        </p:nvSpPr>
+        <p:spPr/>
+        <p:txBody>
           <a:bodyPr>
             <a:normAutofit fontScale="90000"/>
           </a:bodyPr>
@@ -3501,7 +4540,7 @@
           <a:p>
             <a:r>
               <a:rPr lang="en-US" dirty="0" smtClean="0"/>
-              <a:t>Yes Workflow kind of does this</a:t>
+              <a:t>Yes Workflow kind of does this, but for scripts</a:t>
             </a:r>
           </a:p>
           <a:p>
@@ -3590,6 +4629,29 @@
               <a:t>dataframe</a:t>
             </a:r>
             <a:endParaRPr lang="en-US" dirty="0"/>
+          </a:p>
+        </p:txBody>
+      </p:sp>
+      <p:sp>
+        <p:nvSpPr>
+          <p:cNvPr id="4" name="Slide Number Placeholder 3"/>
+          <p:cNvSpPr>
+            <a:spLocks noGrp="1"/>
+          </p:cNvSpPr>
+          <p:nvPr>
+            <p:ph type="sldNum" sz="quarter" idx="12"/>
+          </p:nvPr>
+        </p:nvSpPr>
+        <p:spPr/>
+        <p:txBody>
+          <a:bodyPr/>
+          <a:lstStyle/>
+          <a:p>
+            <a:fld id="{46542EA5-A770-C94D-88E9-5C299D660E39}" type="slidenum">
+              <a:rPr lang="en-US" smtClean="0"/>
+              <a:t>4</a:t>
+            </a:fld>
+            <a:endParaRPr lang="en-US"/>
           </a:p>
         </p:txBody>
       </p:sp>
@@ -3606,7 +4668,152 @@
 </p:sld>
 </file>
 
-<file path=ppt/slides/slide4.xml><?xml version="1.0" encoding="utf-8"?>
+<file path=ppt/slides/slide5.xml><?xml version="1.0" encoding="utf-8"?>
+<p:sld xmlns:a="http://schemas.openxmlformats.org/drawingml/2006/main" xmlns:r="http://schemas.openxmlformats.org/officeDocument/2006/relationships" xmlns:p="http://schemas.openxmlformats.org/presentationml/2006/main">
+  <p:cSld>
+    <p:spTree>
+      <p:nvGrpSpPr>
+        <p:cNvPr id="1" name=""/>
+        <p:cNvGrpSpPr/>
+        <p:nvPr/>
+      </p:nvGrpSpPr>
+      <p:grpSpPr>
+        <a:xfrm>
+          <a:off x="0" y="0"/>
+          <a:ext cx="0" cy="0"/>
+          <a:chOff x="0" y="0"/>
+          <a:chExt cx="0" cy="0"/>
+        </a:xfrm>
+      </p:grpSpPr>
+      <p:sp>
+        <p:nvSpPr>
+          <p:cNvPr id="2" name="Title 1"/>
+          <p:cNvSpPr>
+            <a:spLocks noGrp="1"/>
+          </p:cNvSpPr>
+          <p:nvPr>
+            <p:ph type="title"/>
+          </p:nvPr>
+        </p:nvSpPr>
+        <p:spPr/>
+        <p:txBody>
+          <a:bodyPr/>
+          <a:lstStyle/>
+          <a:p>
+            <a:r>
+              <a:rPr lang="en-US" dirty="0" smtClean="0"/>
+              <a:t>The approach</a:t>
+            </a:r>
+            <a:endParaRPr lang="en-US" dirty="0"/>
+          </a:p>
+        </p:txBody>
+      </p:sp>
+      <p:sp>
+        <p:nvSpPr>
+          <p:cNvPr id="3" name="Content Placeholder 2"/>
+          <p:cNvSpPr>
+            <a:spLocks noGrp="1"/>
+          </p:cNvSpPr>
+          <p:nvPr>
+            <p:ph idx="1"/>
+          </p:nvPr>
+        </p:nvSpPr>
+        <p:spPr>
+          <a:xfrm>
+            <a:off x="914400" y="2769833"/>
+            <a:ext cx="7315200" cy="4088167"/>
+          </a:xfrm>
+        </p:spPr>
+        <p:txBody>
+          <a:bodyPr>
+            <a:normAutofit/>
+          </a:bodyPr>
+          <a:lstStyle/>
+          <a:p>
+            <a:r>
+              <a:rPr lang="en-US" dirty="0" smtClean="0"/>
+              <a:t>Let’s use Python</a:t>
+            </a:r>
+          </a:p>
+          <a:p>
+            <a:pPr lvl="1"/>
+            <a:r>
+              <a:rPr lang="en-US" dirty="0" smtClean="0"/>
+              <a:t>As many standard library modules as possible</a:t>
+            </a:r>
+          </a:p>
+          <a:p>
+            <a:r>
+              <a:rPr lang="en-US" dirty="0" smtClean="0"/>
+              <a:t>“Why not use SQL?”</a:t>
+            </a:r>
+          </a:p>
+          <a:p>
+            <a:pPr lvl="1"/>
+            <a:r>
+              <a:rPr lang="en-US" dirty="0" smtClean="0"/>
+              <a:t>I wanted a command line tool that can traverse files and output a result file. I’m sure I could make this in SQL eventually.</a:t>
+            </a:r>
+          </a:p>
+          <a:p>
+            <a:r>
+              <a:rPr lang="en-US" dirty="0" smtClean="0"/>
+              <a:t>“Why not use R?”</a:t>
+            </a:r>
+          </a:p>
+          <a:p>
+            <a:pPr lvl="1"/>
+            <a:r>
+              <a:rPr lang="en-US" dirty="0" smtClean="0"/>
+              <a:t>The summary() function would be valuable, but the data structure to hold it would be nasty.</a:t>
+            </a:r>
+          </a:p>
+          <a:p>
+            <a:r>
+              <a:rPr lang="en-US" dirty="0" smtClean="0"/>
+              <a:t>Python as “proof of concept language” that could be ported to other systems</a:t>
+            </a:r>
+            <a:endParaRPr lang="en-US" dirty="0"/>
+          </a:p>
+        </p:txBody>
+      </p:sp>
+      <p:sp>
+        <p:nvSpPr>
+          <p:cNvPr id="4" name="Slide Number Placeholder 3"/>
+          <p:cNvSpPr>
+            <a:spLocks noGrp="1"/>
+          </p:cNvSpPr>
+          <p:nvPr>
+            <p:ph type="sldNum" sz="quarter" idx="12"/>
+          </p:nvPr>
+        </p:nvSpPr>
+        <p:spPr/>
+        <p:txBody>
+          <a:bodyPr/>
+          <a:lstStyle/>
+          <a:p>
+            <a:fld id="{46542EA5-A770-C94D-88E9-5C299D660E39}" type="slidenum">
+              <a:rPr lang="en-US" smtClean="0"/>
+              <a:t>5</a:t>
+            </a:fld>
+            <a:endParaRPr lang="en-US"/>
+          </a:p>
+        </p:txBody>
+      </p:sp>
+    </p:spTree>
+    <p:extLst>
+      <p:ext uri="{BB962C8B-B14F-4D97-AF65-F5344CB8AC3E}">
+        <p14:creationId xmlns:p14="http://schemas.microsoft.com/office/powerpoint/2010/main" val="1749413169"/>
+      </p:ext>
+    </p:extLst>
+  </p:cSld>
+  <p:clrMapOvr>
+    <a:masterClrMapping/>
+  </p:clrMapOvr>
+</p:sld>
+</file>
+
+<file path=ppt/slides/slide6.xml><?xml version="1.0" encoding="utf-8"?>
 <p:sld xmlns:a="http://schemas.openxmlformats.org/drawingml/2006/main" xmlns:r="http://schemas.openxmlformats.org/officeDocument/2006/relationships" xmlns:p="http://schemas.openxmlformats.org/presentationml/2006/main">
   <p:cSld>
     <p:spTree>
@@ -3726,6 +4933,71 @@
           </a:prstGeom>
         </p:spPr>
       </p:pic>
+      <p:sp>
+        <p:nvSpPr>
+          <p:cNvPr id="5" name="Slide Number Placeholder 4"/>
+          <p:cNvSpPr>
+            <a:spLocks noGrp="1"/>
+          </p:cNvSpPr>
+          <p:nvPr>
+            <p:ph type="sldNum" sz="quarter" idx="12"/>
+          </p:nvPr>
+        </p:nvSpPr>
+        <p:spPr/>
+        <p:txBody>
+          <a:bodyPr/>
+          <a:lstStyle/>
+          <a:p>
+            <a:fld id="{46542EA5-A770-C94D-88E9-5C299D660E39}" type="slidenum">
+              <a:rPr lang="en-US" smtClean="0"/>
+              <a:t>6</a:t>
+            </a:fld>
+            <a:endParaRPr lang="en-US"/>
+          </a:p>
+        </p:txBody>
+      </p:sp>
+      <p:sp>
+        <p:nvSpPr>
+          <p:cNvPr id="8" name="Rounded Rectangle 7"/>
+          <p:cNvSpPr/>
+          <p:nvPr/>
+        </p:nvSpPr>
+        <p:spPr>
+          <a:xfrm>
+            <a:off x="4533594" y="5789531"/>
+            <a:ext cx="2677263" cy="641764"/>
+          </a:xfrm>
+          <a:prstGeom prst="roundRect">
+            <a:avLst/>
+          </a:prstGeom>
+        </p:spPr>
+        <p:style>
+          <a:lnRef idx="1">
+            <a:schemeClr val="accent2"/>
+          </a:lnRef>
+          <a:fillRef idx="3">
+            <a:schemeClr val="accent2"/>
+          </a:fillRef>
+          <a:effectRef idx="2">
+            <a:schemeClr val="accent2"/>
+          </a:effectRef>
+          <a:fontRef idx="minor">
+            <a:schemeClr val="lt1"/>
+          </a:fontRef>
+        </p:style>
+        <p:txBody>
+          <a:bodyPr rtlCol="0" anchor="ctr"/>
+          <a:lstStyle/>
+          <a:p>
+            <a:pPr algn="ctr"/>
+            <a:r>
+              <a:rPr lang="en-US" dirty="0" smtClean="0"/>
+              <a:t>ICPSR codebook example</a:t>
+            </a:r>
+            <a:endParaRPr lang="en-US" dirty="0"/>
+          </a:p>
+        </p:txBody>
+      </p:sp>
     </p:spTree>
     <p:extLst>
       <p:ext uri="{BB962C8B-B14F-4D97-AF65-F5344CB8AC3E}">
@@ -3739,7 +5011,7 @@
 </p:sld>
 </file>
 
-<file path=ppt/slides/slide5.xml><?xml version="1.0" encoding="utf-8"?>
+<file path=ppt/slides/slide7.xml><?xml version="1.0" encoding="utf-8"?>
 <p:sld xmlns:a="http://schemas.openxmlformats.org/drawingml/2006/main" xmlns:r="http://schemas.openxmlformats.org/officeDocument/2006/relationships" xmlns:p="http://schemas.openxmlformats.org/presentationml/2006/main">
   <p:cSld>
     <p:spTree>
@@ -3791,7 +5063,9 @@
         </p:nvSpPr>
         <p:spPr/>
         <p:txBody>
-          <a:bodyPr/>
+          <a:bodyPr>
+            <a:normAutofit/>
+          </a:bodyPr>
           <a:lstStyle/>
           <a:p>
             <a:r>
@@ -3807,6 +5081,20 @@
             </a:r>
           </a:p>
           <a:p>
+            <a:pPr lvl="1"/>
+            <a:r>
+              <a:rPr lang="en-US" dirty="0" smtClean="0"/>
+              <a:t>Basic descriptive statistics</a:t>
+            </a:r>
+          </a:p>
+          <a:p>
+            <a:pPr lvl="1"/>
+            <a:r>
+              <a:rPr lang="en-US" dirty="0" smtClean="0"/>
+              <a:t>Text content is harder, so skip it!</a:t>
+            </a:r>
+          </a:p>
+          <a:p>
             <a:r>
               <a:rPr lang="en-US" dirty="0" smtClean="0"/>
               <a:t>What can’t be automated?</a:t>
@@ -3830,6 +5118,29 @@
               <a:rPr lang="en-US" dirty="0" smtClean="0"/>
               <a:t>Goal:  have the tool produce a basic readme template that the researcher can just fill information in.</a:t>
             </a:r>
+          </a:p>
+        </p:txBody>
+      </p:sp>
+      <p:sp>
+        <p:nvSpPr>
+          <p:cNvPr id="4" name="Slide Number Placeholder 3"/>
+          <p:cNvSpPr>
+            <a:spLocks noGrp="1"/>
+          </p:cNvSpPr>
+          <p:nvPr>
+            <p:ph type="sldNum" sz="quarter" idx="12"/>
+          </p:nvPr>
+        </p:nvSpPr>
+        <p:spPr/>
+        <p:txBody>
+          <a:bodyPr/>
+          <a:lstStyle/>
+          <a:p>
+            <a:fld id="{46542EA5-A770-C94D-88E9-5C299D660E39}" type="slidenum">
+              <a:rPr lang="en-US" smtClean="0"/>
+              <a:t>7</a:t>
+            </a:fld>
+            <a:endParaRPr lang="en-US"/>
           </a:p>
         </p:txBody>
       </p:sp>
@@ -3846,7 +5157,7 @@
 </p:sld>
 </file>
 
-<file path=ppt/slides/slide6.xml><?xml version="1.0" encoding="utf-8"?>
+<file path=ppt/slides/slide8.xml><?xml version="1.0" encoding="utf-8"?>
 <p:sld xmlns:a="http://schemas.openxmlformats.org/drawingml/2006/main" xmlns:r="http://schemas.openxmlformats.org/officeDocument/2006/relationships" xmlns:p="http://schemas.openxmlformats.org/presentationml/2006/main">
   <p:cSld>
     <p:spTree>
@@ -3925,7 +5236,15 @@
             <a:pPr lvl="1"/>
             <a:r>
               <a:rPr lang="en-US" dirty="0" smtClean="0"/>
-              <a:t>Numbers…</a:t>
+              <a:t>Count things, min, max, missing, </a:t>
+            </a:r>
+            <a:r>
+              <a:rPr lang="en-US" dirty="0" err="1" smtClean="0"/>
+              <a:t>percents</a:t>
+            </a:r>
+            <a:r>
+              <a:rPr lang="en-US" dirty="0" smtClean="0"/>
+              <a:t>, etc.</a:t>
             </a:r>
           </a:p>
           <a:p>
@@ -3967,7 +5286,29 @@
               <a:rPr lang="en-US" dirty="0" smtClean="0"/>
               <a:t>Attempting to render that markup as HTML, but the basic options look odd</a:t>
             </a:r>
-            <a:endParaRPr lang="en-US" dirty="0"/>
+          </a:p>
+        </p:txBody>
+      </p:sp>
+      <p:sp>
+        <p:nvSpPr>
+          <p:cNvPr id="4" name="Slide Number Placeholder 3"/>
+          <p:cNvSpPr>
+            <a:spLocks noGrp="1"/>
+          </p:cNvSpPr>
+          <p:nvPr>
+            <p:ph type="sldNum" sz="quarter" idx="12"/>
+          </p:nvPr>
+        </p:nvSpPr>
+        <p:spPr/>
+        <p:txBody>
+          <a:bodyPr/>
+          <a:lstStyle/>
+          <a:p>
+            <a:fld id="{46542EA5-A770-C94D-88E9-5C299D660E39}" type="slidenum">
+              <a:rPr lang="en-US" smtClean="0"/>
+              <a:t>8</a:t>
+            </a:fld>
+            <a:endParaRPr lang="en-US"/>
           </a:p>
         </p:txBody>
       </p:sp>
@@ -3984,7 +5325,7 @@
 </p:sld>
 </file>
 
-<file path=ppt/slides/slide7.xml><?xml version="1.0" encoding="utf-8"?>
+<file path=ppt/slides/slide9.xml><?xml version="1.0" encoding="utf-8"?>
 <p:sld xmlns:a="http://schemas.openxmlformats.org/drawingml/2006/main" xmlns:r="http://schemas.openxmlformats.org/officeDocument/2006/relationships" xmlns:p="http://schemas.openxmlformats.org/presentationml/2006/main">
   <p:cSld>
     <p:spTree>
@@ -4059,186 +5400,33 @@
           </a:prstGeom>
         </p:spPr>
       </p:pic>
+      <p:sp>
+        <p:nvSpPr>
+          <p:cNvPr id="5" name="Slide Number Placeholder 4"/>
+          <p:cNvSpPr>
+            <a:spLocks noGrp="1"/>
+          </p:cNvSpPr>
+          <p:nvPr>
+            <p:ph type="sldNum" sz="quarter" idx="12"/>
+          </p:nvPr>
+        </p:nvSpPr>
+        <p:spPr/>
+        <p:txBody>
+          <a:bodyPr/>
+          <a:lstStyle/>
+          <a:p>
+            <a:fld id="{46542EA5-A770-C94D-88E9-5C299D660E39}" type="slidenum">
+              <a:rPr lang="en-US" smtClean="0"/>
+              <a:t>9</a:t>
+            </a:fld>
+            <a:endParaRPr lang="en-US"/>
+          </a:p>
+        </p:txBody>
+      </p:sp>
     </p:spTree>
     <p:extLst>
       <p:ext uri="{BB962C8B-B14F-4D97-AF65-F5344CB8AC3E}">
         <p14:creationId xmlns:p14="http://schemas.microsoft.com/office/powerpoint/2010/main" val="555885933"/>
-      </p:ext>
-    </p:extLst>
-  </p:cSld>
-  <p:clrMapOvr>
-    <a:masterClrMapping/>
-  </p:clrMapOvr>
-</p:sld>
-</file>
-
-<file path=ppt/slides/slide8.xml><?xml version="1.0" encoding="utf-8"?>
-<p:sld xmlns:a="http://schemas.openxmlformats.org/drawingml/2006/main" xmlns:r="http://schemas.openxmlformats.org/officeDocument/2006/relationships" xmlns:p="http://schemas.openxmlformats.org/presentationml/2006/main">
-  <p:cSld>
-    <p:spTree>
-      <p:nvGrpSpPr>
-        <p:cNvPr id="1" name=""/>
-        <p:cNvGrpSpPr/>
-        <p:nvPr/>
-      </p:nvGrpSpPr>
-      <p:grpSpPr>
-        <a:xfrm>
-          <a:off x="0" y="0"/>
-          <a:ext cx="0" cy="0"/>
-          <a:chOff x="0" y="0"/>
-          <a:chExt cx="0" cy="0"/>
-        </a:xfrm>
-      </p:grpSpPr>
-      <p:sp>
-        <p:nvSpPr>
-          <p:cNvPr id="4" name="Title 1"/>
-          <p:cNvSpPr>
-            <a:spLocks noGrp="1"/>
-          </p:cNvSpPr>
-          <p:nvPr>
-            <p:ph type="title"/>
-          </p:nvPr>
-        </p:nvSpPr>
-        <p:spPr>
-          <a:xfrm>
-            <a:off x="914400" y="0"/>
-            <a:ext cx="7315200" cy="1154097"/>
-          </a:xfrm>
-        </p:spPr>
-        <p:txBody>
-          <a:bodyPr/>
-          <a:lstStyle/>
-          <a:p>
-            <a:r>
-              <a:rPr lang="en-US" dirty="0" smtClean="0"/>
-              <a:t>Basic use</a:t>
-            </a:r>
-            <a:endParaRPr lang="en-US" dirty="0"/>
-          </a:p>
-        </p:txBody>
-      </p:sp>
-      <p:pic>
-        <p:nvPicPr>
-          <p:cNvPr id="5" name="Picture 4" descr="Screen Shot 2016-04-30 at 9.56.54 PM.png"/>
-          <p:cNvPicPr>
-            <a:picLocks noChangeAspect="1"/>
-          </p:cNvPicPr>
-          <p:nvPr/>
-        </p:nvPicPr>
-        <p:blipFill>
-          <a:blip r:embed="rId2">
-            <a:extLst>
-              <a:ext uri="{28A0092B-C50C-407E-A947-70E740481C1C}">
-                <a14:useLocalDpi xmlns:a14="http://schemas.microsoft.com/office/drawing/2010/main" val="0"/>
-              </a:ext>
-            </a:extLst>
-          </a:blip>
-          <a:stretch>
-            <a:fillRect/>
-          </a:stretch>
-        </p:blipFill>
-        <p:spPr>
-          <a:xfrm>
-            <a:off x="341385" y="877734"/>
-            <a:ext cx="8570473" cy="6662993"/>
-          </a:xfrm>
-          <a:prstGeom prst="rect">
-            <a:avLst/>
-          </a:prstGeom>
-        </p:spPr>
-      </p:pic>
-    </p:spTree>
-    <p:extLst>
-      <p:ext uri="{BB962C8B-B14F-4D97-AF65-F5344CB8AC3E}">
-        <p14:creationId xmlns:p14="http://schemas.microsoft.com/office/powerpoint/2010/main" val="2103891971"/>
-      </p:ext>
-    </p:extLst>
-  </p:cSld>
-  <p:clrMapOvr>
-    <a:masterClrMapping/>
-  </p:clrMapOvr>
-</p:sld>
-</file>
-
-<file path=ppt/slides/slide9.xml><?xml version="1.0" encoding="utf-8"?>
-<p:sld xmlns:a="http://schemas.openxmlformats.org/drawingml/2006/main" xmlns:r="http://schemas.openxmlformats.org/officeDocument/2006/relationships" xmlns:p="http://schemas.openxmlformats.org/presentationml/2006/main">
-  <p:cSld>
-    <p:spTree>
-      <p:nvGrpSpPr>
-        <p:cNvPr id="1" name=""/>
-        <p:cNvGrpSpPr/>
-        <p:nvPr/>
-      </p:nvGrpSpPr>
-      <p:grpSpPr>
-        <a:xfrm>
-          <a:off x="0" y="0"/>
-          <a:ext cx="0" cy="0"/>
-          <a:chOff x="0" y="0"/>
-          <a:chExt cx="0" cy="0"/>
-        </a:xfrm>
-      </p:grpSpPr>
-      <p:sp>
-        <p:nvSpPr>
-          <p:cNvPr id="4" name="Title 1"/>
-          <p:cNvSpPr>
-            <a:spLocks noGrp="1"/>
-          </p:cNvSpPr>
-          <p:nvPr>
-            <p:ph type="title"/>
-          </p:nvPr>
-        </p:nvSpPr>
-        <p:spPr>
-          <a:xfrm>
-            <a:off x="914400" y="0"/>
-            <a:ext cx="7315200" cy="1154097"/>
-          </a:xfrm>
-        </p:spPr>
-        <p:txBody>
-          <a:bodyPr/>
-          <a:lstStyle/>
-          <a:p>
-            <a:r>
-              <a:rPr lang="en-US" dirty="0" smtClean="0"/>
-              <a:t>Basic use</a:t>
-            </a:r>
-            <a:endParaRPr lang="en-US" dirty="0"/>
-          </a:p>
-        </p:txBody>
-      </p:sp>
-      <p:pic>
-        <p:nvPicPr>
-          <p:cNvPr id="2" name="Picture 1" descr="Screen Shot 2016-04-30 at 10.01.25 PM.png"/>
-          <p:cNvPicPr>
-            <a:picLocks noChangeAspect="1"/>
-          </p:cNvPicPr>
-          <p:nvPr/>
-        </p:nvPicPr>
-        <p:blipFill>
-          <a:blip r:embed="rId2">
-            <a:extLst>
-              <a:ext uri="{28A0092B-C50C-407E-A947-70E740481C1C}">
-                <a14:useLocalDpi xmlns:a14="http://schemas.microsoft.com/office/drawing/2010/main" val="0"/>
-              </a:ext>
-            </a:extLst>
-          </a:blip>
-          <a:stretch>
-            <a:fillRect/>
-          </a:stretch>
-        </p:blipFill>
-        <p:spPr>
-          <a:xfrm>
-            <a:off x="0" y="860237"/>
-            <a:ext cx="9144000" cy="6577093"/>
-          </a:xfrm>
-          <a:prstGeom prst="rect">
-            <a:avLst/>
-          </a:prstGeom>
-        </p:spPr>
-      </p:pic>
-    </p:spTree>
-    <p:extLst>
-      <p:ext uri="{BB962C8B-B14F-4D97-AF65-F5344CB8AC3E}">
-        <p14:creationId xmlns:p14="http://schemas.microsoft.com/office/powerpoint/2010/main" val="107101650"/>
       </p:ext>
     </p:extLst>
   </p:cSld>
@@ -4536,4 +5724,644 @@
   <a:objectDefaults/>
   <a:extraClrSchemeLst/>
 </a:theme>
+</file>
+
+<file path=ppt/theme/theme2.xml><?xml version="1.0" encoding="utf-8"?>
+<a:theme xmlns:a="http://schemas.openxmlformats.org/drawingml/2006/main" name="Office Theme">
+  <a:themeElements>
+    <a:clrScheme name="Office">
+      <a:dk1>
+        <a:sysClr val="windowText" lastClr="000000"/>
+      </a:dk1>
+      <a:lt1>
+        <a:sysClr val="window" lastClr="FFFFFF"/>
+      </a:lt1>
+      <a:dk2>
+        <a:srgbClr val="1F497D"/>
+      </a:dk2>
+      <a:lt2>
+        <a:srgbClr val="EEECE1"/>
+      </a:lt2>
+      <a:accent1>
+        <a:srgbClr val="4F81BD"/>
+      </a:accent1>
+      <a:accent2>
+        <a:srgbClr val="C0504D"/>
+      </a:accent2>
+      <a:accent3>
+        <a:srgbClr val="9BBB59"/>
+      </a:accent3>
+      <a:accent4>
+        <a:srgbClr val="8064A2"/>
+      </a:accent4>
+      <a:accent5>
+        <a:srgbClr val="4BACC6"/>
+      </a:accent5>
+      <a:accent6>
+        <a:srgbClr val="F79646"/>
+      </a:accent6>
+      <a:hlink>
+        <a:srgbClr val="0000FF"/>
+      </a:hlink>
+      <a:folHlink>
+        <a:srgbClr val="800080"/>
+      </a:folHlink>
+    </a:clrScheme>
+    <a:fontScheme name="Office">
+      <a:majorFont>
+        <a:latin typeface="Calibri"/>
+        <a:ea typeface=""/>
+        <a:cs typeface=""/>
+        <a:font script="Jpan" typeface="ＭＳ Ｐゴシック"/>
+        <a:font script="Hang" typeface="맑은 고딕"/>
+        <a:font script="Hans" typeface="宋体"/>
+        <a:font script="Hant" typeface="新細明體"/>
+        <a:font script="Arab" typeface="Times New Roman"/>
+        <a:font script="Hebr" typeface="Times New Roman"/>
+        <a:font script="Thai" typeface="Angsana New"/>
+        <a:font script="Ethi" typeface="Nyala"/>
+        <a:font script="Beng" typeface="Vrinda"/>
+        <a:font script="Gujr" typeface="Shruti"/>
+        <a:font script="Khmr" typeface="MoolBoran"/>
+        <a:font script="Knda" typeface="Tunga"/>
+        <a:font script="Guru" typeface="Raavi"/>
+        <a:font script="Cans" typeface="Euphemia"/>
+        <a:font script="Cher" typeface="Plantagenet Cherokee"/>
+        <a:font script="Yiii" typeface="Microsoft Yi Baiti"/>
+        <a:font script="Tibt" typeface="Microsoft Himalaya"/>
+        <a:font script="Thaa" typeface="MV Boli"/>
+        <a:font script="Deva" typeface="Mangal"/>
+        <a:font script="Telu" typeface="Gautami"/>
+        <a:font script="Taml" typeface="Latha"/>
+        <a:font script="Syrc" typeface="Estrangelo Edessa"/>
+        <a:font script="Orya" typeface="Kalinga"/>
+        <a:font script="Mlym" typeface="Kartika"/>
+        <a:font script="Laoo" typeface="DokChampa"/>
+        <a:font script="Sinh" typeface="Iskoola Pota"/>
+        <a:font script="Mong" typeface="Mongolian Baiti"/>
+        <a:font script="Viet" typeface="Times New Roman"/>
+        <a:font script="Uigh" typeface="Microsoft Uighur"/>
+        <a:font script="Geor" typeface="Sylfaen"/>
+      </a:majorFont>
+      <a:minorFont>
+        <a:latin typeface="Calibri"/>
+        <a:ea typeface=""/>
+        <a:cs typeface=""/>
+        <a:font script="Jpan" typeface="ＭＳ Ｐゴシック"/>
+        <a:font script="Hang" typeface="맑은 고딕"/>
+        <a:font script="Hans" typeface="宋体"/>
+        <a:font script="Hant" typeface="新細明體"/>
+        <a:font script="Arab" typeface="Arial"/>
+        <a:font script="Hebr" typeface="Arial"/>
+        <a:font script="Thai" typeface="Cordia New"/>
+        <a:font script="Ethi" typeface="Nyala"/>
+        <a:font script="Beng" typeface="Vrinda"/>
+        <a:font script="Gujr" typeface="Shruti"/>
+        <a:font script="Khmr" typeface="DaunPenh"/>
+        <a:font script="Knda" typeface="Tunga"/>
+        <a:font script="Guru" typeface="Raavi"/>
+        <a:font script="Cans" typeface="Euphemia"/>
+        <a:font script="Cher" typeface="Plantagenet Cherokee"/>
+        <a:font script="Yiii" typeface="Microsoft Yi Baiti"/>
+        <a:font script="Tibt" typeface="Microsoft Himalaya"/>
+        <a:font script="Thaa" typeface="MV Boli"/>
+        <a:font script="Deva" typeface="Mangal"/>
+        <a:font script="Telu" typeface="Gautami"/>
+        <a:font script="Taml" typeface="Latha"/>
+        <a:font script="Syrc" typeface="Estrangelo Edessa"/>
+        <a:font script="Orya" typeface="Kalinga"/>
+        <a:font script="Mlym" typeface="Kartika"/>
+        <a:font script="Laoo" typeface="DokChampa"/>
+        <a:font script="Sinh" typeface="Iskoola Pota"/>
+        <a:font script="Mong" typeface="Mongolian Baiti"/>
+        <a:font script="Viet" typeface="Arial"/>
+        <a:font script="Uigh" typeface="Microsoft Uighur"/>
+        <a:font script="Geor" typeface="Sylfaen"/>
+      </a:minorFont>
+    </a:fontScheme>
+    <a:fmtScheme name="Office">
+      <a:fillStyleLst>
+        <a:solidFill>
+          <a:schemeClr val="phClr"/>
+        </a:solidFill>
+        <a:gradFill rotWithShape="1">
+          <a:gsLst>
+            <a:gs pos="0">
+              <a:schemeClr val="phClr">
+                <a:tint val="50000"/>
+                <a:satMod val="300000"/>
+              </a:schemeClr>
+            </a:gs>
+            <a:gs pos="35000">
+              <a:schemeClr val="phClr">
+                <a:tint val="37000"/>
+                <a:satMod val="300000"/>
+              </a:schemeClr>
+            </a:gs>
+            <a:gs pos="100000">
+              <a:schemeClr val="phClr">
+                <a:tint val="15000"/>
+                <a:satMod val="350000"/>
+              </a:schemeClr>
+            </a:gs>
+          </a:gsLst>
+          <a:lin ang="16200000" scaled="1"/>
+        </a:gradFill>
+        <a:gradFill rotWithShape="1">
+          <a:gsLst>
+            <a:gs pos="0">
+              <a:schemeClr val="phClr">
+                <a:tint val="100000"/>
+                <a:shade val="100000"/>
+                <a:satMod val="130000"/>
+              </a:schemeClr>
+            </a:gs>
+            <a:gs pos="100000">
+              <a:schemeClr val="phClr">
+                <a:tint val="50000"/>
+                <a:shade val="100000"/>
+                <a:satMod val="350000"/>
+              </a:schemeClr>
+            </a:gs>
+          </a:gsLst>
+          <a:lin ang="16200000" scaled="0"/>
+        </a:gradFill>
+      </a:fillStyleLst>
+      <a:lnStyleLst>
+        <a:ln w="9525" cap="flat" cmpd="sng" algn="ctr">
+          <a:solidFill>
+            <a:schemeClr val="phClr">
+              <a:shade val="95000"/>
+              <a:satMod val="105000"/>
+            </a:schemeClr>
+          </a:solidFill>
+          <a:prstDash val="solid"/>
+        </a:ln>
+        <a:ln w="25400" cap="flat" cmpd="sng" algn="ctr">
+          <a:solidFill>
+            <a:schemeClr val="phClr"/>
+          </a:solidFill>
+          <a:prstDash val="solid"/>
+        </a:ln>
+        <a:ln w="38100" cap="flat" cmpd="sng" algn="ctr">
+          <a:solidFill>
+            <a:schemeClr val="phClr"/>
+          </a:solidFill>
+          <a:prstDash val="solid"/>
+        </a:ln>
+      </a:lnStyleLst>
+      <a:effectStyleLst>
+        <a:effectStyle>
+          <a:effectLst>
+            <a:outerShdw blurRad="40000" dist="20000" dir="5400000" rotWithShape="0">
+              <a:srgbClr val="000000">
+                <a:alpha val="38000"/>
+              </a:srgbClr>
+            </a:outerShdw>
+          </a:effectLst>
+        </a:effectStyle>
+        <a:effectStyle>
+          <a:effectLst>
+            <a:outerShdw blurRad="40000" dist="23000" dir="5400000" rotWithShape="0">
+              <a:srgbClr val="000000">
+                <a:alpha val="35000"/>
+              </a:srgbClr>
+            </a:outerShdw>
+          </a:effectLst>
+        </a:effectStyle>
+        <a:effectStyle>
+          <a:effectLst>
+            <a:outerShdw blurRad="40000" dist="23000" dir="5400000" rotWithShape="0">
+              <a:srgbClr val="000000">
+                <a:alpha val="35000"/>
+              </a:srgbClr>
+            </a:outerShdw>
+          </a:effectLst>
+          <a:scene3d>
+            <a:camera prst="orthographicFront">
+              <a:rot lat="0" lon="0" rev="0"/>
+            </a:camera>
+            <a:lightRig rig="threePt" dir="t">
+              <a:rot lat="0" lon="0" rev="1200000"/>
+            </a:lightRig>
+          </a:scene3d>
+          <a:sp3d>
+            <a:bevelT w="63500" h="25400"/>
+          </a:sp3d>
+        </a:effectStyle>
+      </a:effectStyleLst>
+      <a:bgFillStyleLst>
+        <a:solidFill>
+          <a:schemeClr val="phClr"/>
+        </a:solidFill>
+        <a:gradFill rotWithShape="1">
+          <a:gsLst>
+            <a:gs pos="0">
+              <a:schemeClr val="phClr">
+                <a:tint val="40000"/>
+                <a:satMod val="350000"/>
+              </a:schemeClr>
+            </a:gs>
+            <a:gs pos="40000">
+              <a:schemeClr val="phClr">
+                <a:tint val="45000"/>
+                <a:shade val="99000"/>
+                <a:satMod val="350000"/>
+              </a:schemeClr>
+            </a:gs>
+            <a:gs pos="100000">
+              <a:schemeClr val="phClr">
+                <a:shade val="20000"/>
+                <a:satMod val="255000"/>
+              </a:schemeClr>
+            </a:gs>
+          </a:gsLst>
+          <a:path path="circle">
+            <a:fillToRect l="50000" t="-80000" r="50000" b="180000"/>
+          </a:path>
+        </a:gradFill>
+        <a:gradFill rotWithShape="1">
+          <a:gsLst>
+            <a:gs pos="0">
+              <a:schemeClr val="phClr">
+                <a:tint val="80000"/>
+                <a:satMod val="300000"/>
+              </a:schemeClr>
+            </a:gs>
+            <a:gs pos="100000">
+              <a:schemeClr val="phClr">
+                <a:shade val="30000"/>
+                <a:satMod val="200000"/>
+              </a:schemeClr>
+            </a:gs>
+          </a:gsLst>
+          <a:path path="circle">
+            <a:fillToRect l="50000" t="50000" r="50000" b="50000"/>
+          </a:path>
+        </a:gradFill>
+      </a:bgFillStyleLst>
+    </a:fmtScheme>
+  </a:themeElements>
+  <a:objectDefaults>
+    <a:spDef>
+      <a:spPr/>
+      <a:bodyPr/>
+      <a:lstStyle/>
+      <a:style>
+        <a:lnRef idx="1">
+          <a:schemeClr val="accent1"/>
+        </a:lnRef>
+        <a:fillRef idx="3">
+          <a:schemeClr val="accent1"/>
+        </a:fillRef>
+        <a:effectRef idx="2">
+          <a:schemeClr val="accent1"/>
+        </a:effectRef>
+        <a:fontRef idx="minor">
+          <a:schemeClr val="lt1"/>
+        </a:fontRef>
+      </a:style>
+    </a:spDef>
+    <a:lnDef>
+      <a:spPr/>
+      <a:bodyPr/>
+      <a:lstStyle/>
+      <a:style>
+        <a:lnRef idx="2">
+          <a:schemeClr val="accent1"/>
+        </a:lnRef>
+        <a:fillRef idx="0">
+          <a:schemeClr val="accent1"/>
+        </a:fillRef>
+        <a:effectRef idx="1">
+          <a:schemeClr val="accent1"/>
+        </a:effectRef>
+        <a:fontRef idx="minor">
+          <a:schemeClr val="tx1"/>
+        </a:fontRef>
+      </a:style>
+    </a:lnDef>
+  </a:objectDefaults>
+  <a:extraClrSchemeLst/>
+</a:theme>
+</file>
+
+<file path=ppt/theme/theme3.xml><?xml version="1.0" encoding="utf-8"?>
+<a:theme xmlns:a="http://schemas.openxmlformats.org/drawingml/2006/main" name="Office Theme">
+  <a:themeElements>
+    <a:clrScheme name="Office">
+      <a:dk1>
+        <a:sysClr val="windowText" lastClr="000000"/>
+      </a:dk1>
+      <a:lt1>
+        <a:sysClr val="window" lastClr="FFFFFF"/>
+      </a:lt1>
+      <a:dk2>
+        <a:srgbClr val="1F497D"/>
+      </a:dk2>
+      <a:lt2>
+        <a:srgbClr val="EEECE1"/>
+      </a:lt2>
+      <a:accent1>
+        <a:srgbClr val="4F81BD"/>
+      </a:accent1>
+      <a:accent2>
+        <a:srgbClr val="C0504D"/>
+      </a:accent2>
+      <a:accent3>
+        <a:srgbClr val="9BBB59"/>
+      </a:accent3>
+      <a:accent4>
+        <a:srgbClr val="8064A2"/>
+      </a:accent4>
+      <a:accent5>
+        <a:srgbClr val="4BACC6"/>
+      </a:accent5>
+      <a:accent6>
+        <a:srgbClr val="F79646"/>
+      </a:accent6>
+      <a:hlink>
+        <a:srgbClr val="0000FF"/>
+      </a:hlink>
+      <a:folHlink>
+        <a:srgbClr val="800080"/>
+      </a:folHlink>
+    </a:clrScheme>
+    <a:fontScheme name="Office">
+      <a:majorFont>
+        <a:latin typeface="Calibri"/>
+        <a:ea typeface=""/>
+        <a:cs typeface=""/>
+        <a:font script="Jpan" typeface="ＭＳ Ｐゴシック"/>
+        <a:font script="Hang" typeface="맑은 고딕"/>
+        <a:font script="Hans" typeface="宋体"/>
+        <a:font script="Hant" typeface="新細明體"/>
+        <a:font script="Arab" typeface="Times New Roman"/>
+        <a:font script="Hebr" typeface="Times New Roman"/>
+        <a:font script="Thai" typeface="Angsana New"/>
+        <a:font script="Ethi" typeface="Nyala"/>
+        <a:font script="Beng" typeface="Vrinda"/>
+        <a:font script="Gujr" typeface="Shruti"/>
+        <a:font script="Khmr" typeface="MoolBoran"/>
+        <a:font script="Knda" typeface="Tunga"/>
+        <a:font script="Guru" typeface="Raavi"/>
+        <a:font script="Cans" typeface="Euphemia"/>
+        <a:font script="Cher" typeface="Plantagenet Cherokee"/>
+        <a:font script="Yiii" typeface="Microsoft Yi Baiti"/>
+        <a:font script="Tibt" typeface="Microsoft Himalaya"/>
+        <a:font script="Thaa" typeface="MV Boli"/>
+        <a:font script="Deva" typeface="Mangal"/>
+        <a:font script="Telu" typeface="Gautami"/>
+        <a:font script="Taml" typeface="Latha"/>
+        <a:font script="Syrc" typeface="Estrangelo Edessa"/>
+        <a:font script="Orya" typeface="Kalinga"/>
+        <a:font script="Mlym" typeface="Kartika"/>
+        <a:font script="Laoo" typeface="DokChampa"/>
+        <a:font script="Sinh" typeface="Iskoola Pota"/>
+        <a:font script="Mong" typeface="Mongolian Baiti"/>
+        <a:font script="Viet" typeface="Times New Roman"/>
+        <a:font script="Uigh" typeface="Microsoft Uighur"/>
+        <a:font script="Geor" typeface="Sylfaen"/>
+      </a:majorFont>
+      <a:minorFont>
+        <a:latin typeface="Calibri"/>
+        <a:ea typeface=""/>
+        <a:cs typeface=""/>
+        <a:font script="Jpan" typeface="ＭＳ Ｐゴシック"/>
+        <a:font script="Hang" typeface="맑은 고딕"/>
+        <a:font script="Hans" typeface="宋体"/>
+        <a:font script="Hant" typeface="新細明體"/>
+        <a:font script="Arab" typeface="Arial"/>
+        <a:font script="Hebr" typeface="Arial"/>
+        <a:font script="Thai" typeface="Cordia New"/>
+        <a:font script="Ethi" typeface="Nyala"/>
+        <a:font script="Beng" typeface="Vrinda"/>
+        <a:font script="Gujr" typeface="Shruti"/>
+        <a:font script="Khmr" typeface="DaunPenh"/>
+        <a:font script="Knda" typeface="Tunga"/>
+        <a:font script="Guru" typeface="Raavi"/>
+        <a:font script="Cans" typeface="Euphemia"/>
+        <a:font script="Cher" typeface="Plantagenet Cherokee"/>
+        <a:font script="Yiii" typeface="Microsoft Yi Baiti"/>
+        <a:font script="Tibt" typeface="Microsoft Himalaya"/>
+        <a:font script="Thaa" typeface="MV Boli"/>
+        <a:font script="Deva" typeface="Mangal"/>
+        <a:font script="Telu" typeface="Gautami"/>
+        <a:font script="Taml" typeface="Latha"/>
+        <a:font script="Syrc" typeface="Estrangelo Edessa"/>
+        <a:font script="Orya" typeface="Kalinga"/>
+        <a:font script="Mlym" typeface="Kartika"/>
+        <a:font script="Laoo" typeface="DokChampa"/>
+        <a:font script="Sinh" typeface="Iskoola Pota"/>
+        <a:font script="Mong" typeface="Mongolian Baiti"/>
+        <a:font script="Viet" typeface="Arial"/>
+        <a:font script="Uigh" typeface="Microsoft Uighur"/>
+        <a:font script="Geor" typeface="Sylfaen"/>
+      </a:minorFont>
+    </a:fontScheme>
+    <a:fmtScheme name="Office">
+      <a:fillStyleLst>
+        <a:solidFill>
+          <a:schemeClr val="phClr"/>
+        </a:solidFill>
+        <a:gradFill rotWithShape="1">
+          <a:gsLst>
+            <a:gs pos="0">
+              <a:schemeClr val="phClr">
+                <a:tint val="50000"/>
+                <a:satMod val="300000"/>
+              </a:schemeClr>
+            </a:gs>
+            <a:gs pos="35000">
+              <a:schemeClr val="phClr">
+                <a:tint val="37000"/>
+                <a:satMod val="300000"/>
+              </a:schemeClr>
+            </a:gs>
+            <a:gs pos="100000">
+              <a:schemeClr val="phClr">
+                <a:tint val="15000"/>
+                <a:satMod val="350000"/>
+              </a:schemeClr>
+            </a:gs>
+          </a:gsLst>
+          <a:lin ang="16200000" scaled="1"/>
+        </a:gradFill>
+        <a:gradFill rotWithShape="1">
+          <a:gsLst>
+            <a:gs pos="0">
+              <a:schemeClr val="phClr">
+                <a:tint val="100000"/>
+                <a:shade val="100000"/>
+                <a:satMod val="130000"/>
+              </a:schemeClr>
+            </a:gs>
+            <a:gs pos="100000">
+              <a:schemeClr val="phClr">
+                <a:tint val="50000"/>
+                <a:shade val="100000"/>
+                <a:satMod val="350000"/>
+              </a:schemeClr>
+            </a:gs>
+          </a:gsLst>
+          <a:lin ang="16200000" scaled="0"/>
+        </a:gradFill>
+      </a:fillStyleLst>
+      <a:lnStyleLst>
+        <a:ln w="9525" cap="flat" cmpd="sng" algn="ctr">
+          <a:solidFill>
+            <a:schemeClr val="phClr">
+              <a:shade val="95000"/>
+              <a:satMod val="105000"/>
+            </a:schemeClr>
+          </a:solidFill>
+          <a:prstDash val="solid"/>
+        </a:ln>
+        <a:ln w="25400" cap="flat" cmpd="sng" algn="ctr">
+          <a:solidFill>
+            <a:schemeClr val="phClr"/>
+          </a:solidFill>
+          <a:prstDash val="solid"/>
+        </a:ln>
+        <a:ln w="38100" cap="flat" cmpd="sng" algn="ctr">
+          <a:solidFill>
+            <a:schemeClr val="phClr"/>
+          </a:solidFill>
+          <a:prstDash val="solid"/>
+        </a:ln>
+      </a:lnStyleLst>
+      <a:effectStyleLst>
+        <a:effectStyle>
+          <a:effectLst>
+            <a:outerShdw blurRad="40000" dist="20000" dir="5400000" rotWithShape="0">
+              <a:srgbClr val="000000">
+                <a:alpha val="38000"/>
+              </a:srgbClr>
+            </a:outerShdw>
+          </a:effectLst>
+        </a:effectStyle>
+        <a:effectStyle>
+          <a:effectLst>
+            <a:outerShdw blurRad="40000" dist="23000" dir="5400000" rotWithShape="0">
+              <a:srgbClr val="000000">
+                <a:alpha val="35000"/>
+              </a:srgbClr>
+            </a:outerShdw>
+          </a:effectLst>
+        </a:effectStyle>
+        <a:effectStyle>
+          <a:effectLst>
+            <a:outerShdw blurRad="40000" dist="23000" dir="5400000" rotWithShape="0">
+              <a:srgbClr val="000000">
+                <a:alpha val="35000"/>
+              </a:srgbClr>
+            </a:outerShdw>
+          </a:effectLst>
+          <a:scene3d>
+            <a:camera prst="orthographicFront">
+              <a:rot lat="0" lon="0" rev="0"/>
+            </a:camera>
+            <a:lightRig rig="threePt" dir="t">
+              <a:rot lat="0" lon="0" rev="1200000"/>
+            </a:lightRig>
+          </a:scene3d>
+          <a:sp3d>
+            <a:bevelT w="63500" h="25400"/>
+          </a:sp3d>
+        </a:effectStyle>
+      </a:effectStyleLst>
+      <a:bgFillStyleLst>
+        <a:solidFill>
+          <a:schemeClr val="phClr"/>
+        </a:solidFill>
+        <a:gradFill rotWithShape="1">
+          <a:gsLst>
+            <a:gs pos="0">
+              <a:schemeClr val="phClr">
+                <a:tint val="40000"/>
+                <a:satMod val="350000"/>
+              </a:schemeClr>
+            </a:gs>
+            <a:gs pos="40000">
+              <a:schemeClr val="phClr">
+                <a:tint val="45000"/>
+                <a:shade val="99000"/>
+                <a:satMod val="350000"/>
+              </a:schemeClr>
+            </a:gs>
+            <a:gs pos="100000">
+              <a:schemeClr val="phClr">
+                <a:shade val="20000"/>
+                <a:satMod val="255000"/>
+              </a:schemeClr>
+            </a:gs>
+          </a:gsLst>
+          <a:path path="circle">
+            <a:fillToRect l="50000" t="-80000" r="50000" b="180000"/>
+          </a:path>
+        </a:gradFill>
+        <a:gradFill rotWithShape="1">
+          <a:gsLst>
+            <a:gs pos="0">
+              <a:schemeClr val="phClr">
+                <a:tint val="80000"/>
+                <a:satMod val="300000"/>
+              </a:schemeClr>
+            </a:gs>
+            <a:gs pos="100000">
+              <a:schemeClr val="phClr">
+                <a:shade val="30000"/>
+                <a:satMod val="200000"/>
+              </a:schemeClr>
+            </a:gs>
+          </a:gsLst>
+          <a:path path="circle">
+            <a:fillToRect l="50000" t="50000" r="50000" b="50000"/>
+          </a:path>
+        </a:gradFill>
+      </a:bgFillStyleLst>
+    </a:fmtScheme>
+  </a:themeElements>
+  <a:objectDefaults>
+    <a:spDef>
+      <a:spPr/>
+      <a:bodyPr/>
+      <a:lstStyle/>
+      <a:style>
+        <a:lnRef idx="1">
+          <a:schemeClr val="accent1"/>
+        </a:lnRef>
+        <a:fillRef idx="3">
+          <a:schemeClr val="accent1"/>
+        </a:fillRef>
+        <a:effectRef idx="2">
+          <a:schemeClr val="accent1"/>
+        </a:effectRef>
+        <a:fontRef idx="minor">
+          <a:schemeClr val="lt1"/>
+        </a:fontRef>
+      </a:style>
+    </a:spDef>
+    <a:lnDef>
+      <a:spPr/>
+      <a:bodyPr/>
+      <a:lstStyle/>
+      <a:style>
+        <a:lnRef idx="2">
+          <a:schemeClr val="accent1"/>
+        </a:lnRef>
+        <a:fillRef idx="0">
+          <a:schemeClr val="accent1"/>
+        </a:fillRef>
+        <a:effectRef idx="1">
+          <a:schemeClr val="accent1"/>
+        </a:effectRef>
+        <a:fontRef idx="minor">
+          <a:schemeClr val="tx1"/>
+        </a:fontRef>
+      </a:style>
+    </a:lnDef>
+  </a:objectDefaults>
+  <a:extraClrSchemeLst/>
+</a:theme>
 </file>
</xml_diff>